<commit_message>
use st labels on figure 10
</commit_message>
<xml_diff>
--- a/data/nrd/nrd-annotated-phylogeny.pptx
+++ b/data/nrd/nrd-annotated-phylogeny.pptx
@@ -6,6 +6,7 @@
   </p:sldMasterIdLst>
   <p:sldIdLst>
     <p:sldId id="256" r:id="rId2"/>
+    <p:sldId id="257" r:id="rId3"/>
   </p:sldIdLst>
   <p:sldSz cx="7315200" cy="7315200"/>
   <p:notesSz cx="6858000" cy="9144000"/>
@@ -254,7 +255,7 @@
           <a:p>
             <a:fld id="{797085E7-40F9-A64E-8856-170C486A5FE0}" type="datetimeFigureOut">
               <a:rPr lang="en-US" smtClean="0"/>
-              <a:t>4/8/18</a:t>
+              <a:t>4/10/18</a:t>
             </a:fld>
             <a:endParaRPr lang="en-US"/>
           </a:p>
@@ -424,7 +425,7 @@
           <a:p>
             <a:fld id="{797085E7-40F9-A64E-8856-170C486A5FE0}" type="datetimeFigureOut">
               <a:rPr lang="en-US" smtClean="0"/>
-              <a:t>4/8/18</a:t>
+              <a:t>4/10/18</a:t>
             </a:fld>
             <a:endParaRPr lang="en-US"/>
           </a:p>
@@ -604,7 +605,7 @@
           <a:p>
             <a:fld id="{797085E7-40F9-A64E-8856-170C486A5FE0}" type="datetimeFigureOut">
               <a:rPr lang="en-US" smtClean="0"/>
-              <a:t>4/8/18</a:t>
+              <a:t>4/10/18</a:t>
             </a:fld>
             <a:endParaRPr lang="en-US"/>
           </a:p>
@@ -774,7 +775,7 @@
           <a:p>
             <a:fld id="{797085E7-40F9-A64E-8856-170C486A5FE0}" type="datetimeFigureOut">
               <a:rPr lang="en-US" smtClean="0"/>
-              <a:t>4/8/18</a:t>
+              <a:t>4/10/18</a:t>
             </a:fld>
             <a:endParaRPr lang="en-US"/>
           </a:p>
@@ -1018,7 +1019,7 @@
           <a:p>
             <a:fld id="{797085E7-40F9-A64E-8856-170C486A5FE0}" type="datetimeFigureOut">
               <a:rPr lang="en-US" smtClean="0"/>
-              <a:t>4/8/18</a:t>
+              <a:t>4/10/18</a:t>
             </a:fld>
             <a:endParaRPr lang="en-US"/>
           </a:p>
@@ -1250,7 +1251,7 @@
           <a:p>
             <a:fld id="{797085E7-40F9-A64E-8856-170C486A5FE0}" type="datetimeFigureOut">
               <a:rPr lang="en-US" smtClean="0"/>
-              <a:t>4/8/18</a:t>
+              <a:t>4/10/18</a:t>
             </a:fld>
             <a:endParaRPr lang="en-US"/>
           </a:p>
@@ -1617,7 +1618,7 @@
           <a:p>
             <a:fld id="{797085E7-40F9-A64E-8856-170C486A5FE0}" type="datetimeFigureOut">
               <a:rPr lang="en-US" smtClean="0"/>
-              <a:t>4/8/18</a:t>
+              <a:t>4/10/18</a:t>
             </a:fld>
             <a:endParaRPr lang="en-US"/>
           </a:p>
@@ -1735,7 +1736,7 @@
           <a:p>
             <a:fld id="{797085E7-40F9-A64E-8856-170C486A5FE0}" type="datetimeFigureOut">
               <a:rPr lang="en-US" smtClean="0"/>
-              <a:t>4/8/18</a:t>
+              <a:t>4/10/18</a:t>
             </a:fld>
             <a:endParaRPr lang="en-US"/>
           </a:p>
@@ -1830,7 +1831,7 @@
           <a:p>
             <a:fld id="{797085E7-40F9-A64E-8856-170C486A5FE0}" type="datetimeFigureOut">
               <a:rPr lang="en-US" smtClean="0"/>
-              <a:t>4/8/18</a:t>
+              <a:t>4/10/18</a:t>
             </a:fld>
             <a:endParaRPr lang="en-US"/>
           </a:p>
@@ -2107,7 +2108,7 @@
           <a:p>
             <a:fld id="{797085E7-40F9-A64E-8856-170C486A5FE0}" type="datetimeFigureOut">
               <a:rPr lang="en-US" smtClean="0"/>
-              <a:t>4/8/18</a:t>
+              <a:t>4/10/18</a:t>
             </a:fld>
             <a:endParaRPr lang="en-US"/>
           </a:p>
@@ -2364,7 +2365,7 @@
           <a:p>
             <a:fld id="{797085E7-40F9-A64E-8856-170C486A5FE0}" type="datetimeFigureOut">
               <a:rPr lang="en-US" smtClean="0"/>
-              <a:t>4/8/18</a:t>
+              <a:t>4/10/18</a:t>
             </a:fld>
             <a:endParaRPr lang="en-US"/>
           </a:p>
@@ -2577,7 +2578,7 @@
           <a:p>
             <a:fld id="{797085E7-40F9-A64E-8856-170C486A5FE0}" type="datetimeFigureOut">
               <a:rPr lang="en-US" smtClean="0"/>
-              <a:t>4/8/18</a:t>
+              <a:t>4/10/18</a:t>
             </a:fld>
             <a:endParaRPr lang="en-US"/>
           </a:p>
@@ -3906,10 +3907,1058 @@
           </a:p>
         </p:txBody>
       </p:sp>
+      <p:sp>
+        <p:nvSpPr>
+          <p:cNvPr id="33" name="Oval 32">
+            <a:extLst>
+              <a:ext uri="{FF2B5EF4-FFF2-40B4-BE49-F238E27FC236}">
+                <a16:creationId xmlns:a16="http://schemas.microsoft.com/office/drawing/2014/main" id="{144F84FA-56CA-0544-B3E5-B2E5B2DB8CDF}"/>
+              </a:ext>
+            </a:extLst>
+          </p:cNvPr>
+          <p:cNvSpPr/>
+          <p:nvPr/>
+        </p:nvSpPr>
+        <p:spPr>
+          <a:xfrm>
+            <a:off x="2355669" y="413658"/>
+            <a:ext cx="278674" cy="269966"/>
+          </a:xfrm>
+          <a:prstGeom prst="ellipse">
+            <a:avLst/>
+          </a:prstGeom>
+          <a:solidFill>
+            <a:srgbClr val="A74E5D">
+              <a:alpha val="39608"/>
+            </a:srgbClr>
+          </a:solidFill>
+          <a:ln>
+            <a:solidFill>
+              <a:srgbClr val="A74E5D"/>
+            </a:solidFill>
+          </a:ln>
+        </p:spPr>
+        <p:style>
+          <a:lnRef idx="2">
+            <a:schemeClr val="accent1">
+              <a:shade val="50000"/>
+            </a:schemeClr>
+          </a:lnRef>
+          <a:fillRef idx="1">
+            <a:schemeClr val="accent1"/>
+          </a:fillRef>
+          <a:effectRef idx="0">
+            <a:schemeClr val="accent1"/>
+          </a:effectRef>
+          <a:fontRef idx="minor">
+            <a:schemeClr val="lt1"/>
+          </a:fontRef>
+        </p:style>
+        <p:txBody>
+          <a:bodyPr rtlCol="0" anchor="ctr"/>
+          <a:lstStyle/>
+          <a:p>
+            <a:pPr algn="ctr"/>
+            <a:endParaRPr lang="en-US"/>
+          </a:p>
+        </p:txBody>
+      </p:sp>
+      <p:sp>
+        <p:nvSpPr>
+          <p:cNvPr id="34" name="TextBox 33">
+            <a:extLst>
+              <a:ext uri="{FF2B5EF4-FFF2-40B4-BE49-F238E27FC236}">
+                <a16:creationId xmlns:a16="http://schemas.microsoft.com/office/drawing/2014/main" id="{EC8DC41D-589C-044C-A48A-561388033D5C}"/>
+              </a:ext>
+            </a:extLst>
+          </p:cNvPr>
+          <p:cNvSpPr txBox="1"/>
+          <p:nvPr/>
+        </p:nvSpPr>
+        <p:spPr>
+          <a:xfrm>
+            <a:off x="2477589" y="234479"/>
+            <a:ext cx="731520" cy="276999"/>
+          </a:xfrm>
+          <a:prstGeom prst="rect">
+            <a:avLst/>
+          </a:prstGeom>
+          <a:noFill/>
+        </p:spPr>
+        <p:txBody>
+          <a:bodyPr wrap="square" rtlCol="0">
+            <a:spAutoFit/>
+          </a:bodyPr>
+          <a:lstStyle/>
+          <a:p>
+            <a:r>
+              <a:rPr lang="en-US" sz="1200" b="1" dirty="0">
+                <a:latin typeface="Arial" panose="020B0604020202020204" pitchFamily="34" charset="0"/>
+                <a:cs typeface="Arial" panose="020B0604020202020204" pitchFamily="34" charset="0"/>
+              </a:rPr>
+              <a:t>CC15</a:t>
+            </a:r>
+          </a:p>
+        </p:txBody>
+      </p:sp>
+      <p:sp>
+        <p:nvSpPr>
+          <p:cNvPr id="35" name="Oval 34">
+            <a:extLst>
+              <a:ext uri="{FF2B5EF4-FFF2-40B4-BE49-F238E27FC236}">
+                <a16:creationId xmlns:a16="http://schemas.microsoft.com/office/drawing/2014/main" id="{F59E5D99-17FC-B347-9694-CF0CCC1F3782}"/>
+              </a:ext>
+            </a:extLst>
+          </p:cNvPr>
+          <p:cNvSpPr/>
+          <p:nvPr/>
+        </p:nvSpPr>
+        <p:spPr>
+          <a:xfrm>
+            <a:off x="1750424" y="376495"/>
+            <a:ext cx="278674" cy="269966"/>
+          </a:xfrm>
+          <a:prstGeom prst="ellipse">
+            <a:avLst/>
+          </a:prstGeom>
+          <a:solidFill>
+            <a:schemeClr val="accent3">
+              <a:lumMod val="75000"/>
+              <a:alpha val="39608"/>
+            </a:schemeClr>
+          </a:solidFill>
+          <a:ln>
+            <a:solidFill>
+              <a:schemeClr val="accent3">
+                <a:lumMod val="75000"/>
+              </a:schemeClr>
+            </a:solidFill>
+          </a:ln>
+        </p:spPr>
+        <p:style>
+          <a:lnRef idx="2">
+            <a:schemeClr val="accent1">
+              <a:shade val="50000"/>
+            </a:schemeClr>
+          </a:lnRef>
+          <a:fillRef idx="1">
+            <a:schemeClr val="accent1"/>
+          </a:fillRef>
+          <a:effectRef idx="0">
+            <a:schemeClr val="accent1"/>
+          </a:effectRef>
+          <a:fontRef idx="minor">
+            <a:schemeClr val="lt1"/>
+          </a:fontRef>
+        </p:style>
+        <p:txBody>
+          <a:bodyPr rtlCol="0" anchor="ctr"/>
+          <a:lstStyle/>
+          <a:p>
+            <a:pPr algn="ctr"/>
+            <a:endParaRPr lang="en-US"/>
+          </a:p>
+        </p:txBody>
+      </p:sp>
+      <p:sp>
+        <p:nvSpPr>
+          <p:cNvPr id="36" name="TextBox 35">
+            <a:extLst>
+              <a:ext uri="{FF2B5EF4-FFF2-40B4-BE49-F238E27FC236}">
+                <a16:creationId xmlns:a16="http://schemas.microsoft.com/office/drawing/2014/main" id="{0A97377B-5776-554F-84AB-7D0E2FC23ABD}"/>
+              </a:ext>
+            </a:extLst>
+          </p:cNvPr>
+          <p:cNvSpPr txBox="1"/>
+          <p:nvPr/>
+        </p:nvSpPr>
+        <p:spPr>
+          <a:xfrm>
+            <a:off x="1341121" y="354373"/>
+            <a:ext cx="522514" cy="276999"/>
+          </a:xfrm>
+          <a:prstGeom prst="rect">
+            <a:avLst/>
+          </a:prstGeom>
+          <a:noFill/>
+        </p:spPr>
+        <p:txBody>
+          <a:bodyPr wrap="square" rtlCol="0">
+            <a:spAutoFit/>
+          </a:bodyPr>
+          <a:lstStyle/>
+          <a:p>
+            <a:r>
+              <a:rPr lang="en-US" sz="1200" b="1" dirty="0">
+                <a:latin typeface="Arial" panose="020B0604020202020204" pitchFamily="34" charset="0"/>
+                <a:cs typeface="Arial" panose="020B0604020202020204" pitchFamily="34" charset="0"/>
+              </a:rPr>
+              <a:t>CC1</a:t>
+            </a:r>
+          </a:p>
+        </p:txBody>
+      </p:sp>
+      <p:sp>
+        <p:nvSpPr>
+          <p:cNvPr id="37" name="Oval 36">
+            <a:extLst>
+              <a:ext uri="{FF2B5EF4-FFF2-40B4-BE49-F238E27FC236}">
+                <a16:creationId xmlns:a16="http://schemas.microsoft.com/office/drawing/2014/main" id="{04826650-B003-334A-A582-83D0E9954F4C}"/>
+              </a:ext>
+            </a:extLst>
+          </p:cNvPr>
+          <p:cNvSpPr/>
+          <p:nvPr/>
+        </p:nvSpPr>
+        <p:spPr>
+          <a:xfrm>
+            <a:off x="603704" y="5983604"/>
+            <a:ext cx="278674" cy="269966"/>
+          </a:xfrm>
+          <a:prstGeom prst="ellipse">
+            <a:avLst/>
+          </a:prstGeom>
+          <a:solidFill>
+            <a:schemeClr val="accent4">
+              <a:lumMod val="40000"/>
+              <a:lumOff val="60000"/>
+              <a:alpha val="39608"/>
+            </a:schemeClr>
+          </a:solidFill>
+          <a:ln>
+            <a:solidFill>
+              <a:schemeClr val="accent4">
+                <a:lumMod val="40000"/>
+                <a:lumOff val="60000"/>
+              </a:schemeClr>
+            </a:solidFill>
+          </a:ln>
+        </p:spPr>
+        <p:style>
+          <a:lnRef idx="2">
+            <a:schemeClr val="accent1">
+              <a:shade val="50000"/>
+            </a:schemeClr>
+          </a:lnRef>
+          <a:fillRef idx="1">
+            <a:schemeClr val="accent1"/>
+          </a:fillRef>
+          <a:effectRef idx="0">
+            <a:schemeClr val="accent1"/>
+          </a:effectRef>
+          <a:fontRef idx="minor">
+            <a:schemeClr val="lt1"/>
+          </a:fontRef>
+        </p:style>
+        <p:txBody>
+          <a:bodyPr rtlCol="0" anchor="ctr"/>
+          <a:lstStyle/>
+          <a:p>
+            <a:pPr algn="ctr"/>
+            <a:endParaRPr lang="en-US"/>
+          </a:p>
+        </p:txBody>
+      </p:sp>
+      <p:sp>
+        <p:nvSpPr>
+          <p:cNvPr id="38" name="TextBox 37">
+            <a:extLst>
+              <a:ext uri="{FF2B5EF4-FFF2-40B4-BE49-F238E27FC236}">
+                <a16:creationId xmlns:a16="http://schemas.microsoft.com/office/drawing/2014/main" id="{4977D4E8-7645-6D4B-986E-7B828FDEEBDD}"/>
+              </a:ext>
+            </a:extLst>
+          </p:cNvPr>
+          <p:cNvSpPr txBox="1"/>
+          <p:nvPr/>
+        </p:nvSpPr>
+        <p:spPr>
+          <a:xfrm>
+            <a:off x="0" y="5980087"/>
+            <a:ext cx="731520" cy="276999"/>
+          </a:xfrm>
+          <a:prstGeom prst="rect">
+            <a:avLst/>
+          </a:prstGeom>
+          <a:noFill/>
+        </p:spPr>
+        <p:txBody>
+          <a:bodyPr wrap="square" rtlCol="0">
+            <a:spAutoFit/>
+          </a:bodyPr>
+          <a:lstStyle/>
+          <a:p>
+            <a:r>
+              <a:rPr lang="en-US" sz="1200" b="1" dirty="0">
+                <a:latin typeface="Arial" panose="020B0604020202020204" pitchFamily="34" charset="0"/>
+                <a:cs typeface="Arial" panose="020B0604020202020204" pitchFamily="34" charset="0"/>
+              </a:rPr>
+              <a:t>CC121</a:t>
+            </a:r>
+          </a:p>
+        </p:txBody>
+      </p:sp>
     </p:spTree>
     <p:extLst>
       <p:ext uri="{BB962C8B-B14F-4D97-AF65-F5344CB8AC3E}">
         <p14:creationId xmlns:p14="http://schemas.microsoft.com/office/powerpoint/2010/main" val="495933287"/>
+      </p:ext>
+    </p:extLst>
+  </p:cSld>
+  <p:clrMapOvr>
+    <a:masterClrMapping/>
+  </p:clrMapOvr>
+</p:sld>
+</file>
+
+<file path=ppt/slides/slide2.xml><?xml version="1.0" encoding="utf-8"?>
+<p:sld xmlns:a="http://schemas.openxmlformats.org/drawingml/2006/main" xmlns:r="http://schemas.openxmlformats.org/officeDocument/2006/relationships" xmlns:p="http://schemas.openxmlformats.org/presentationml/2006/main">
+  <p:cSld>
+    <p:spTree>
+      <p:nvGrpSpPr>
+        <p:cNvPr id="1" name=""/>
+        <p:cNvGrpSpPr/>
+        <p:nvPr/>
+      </p:nvGrpSpPr>
+      <p:grpSpPr>
+        <a:xfrm>
+          <a:off x="0" y="0"/>
+          <a:ext cx="0" cy="0"/>
+          <a:chOff x="0" y="0"/>
+          <a:chExt cx="0" cy="0"/>
+        </a:xfrm>
+      </p:grpSpPr>
+      <p:grpSp>
+        <p:nvGrpSpPr>
+          <p:cNvPr id="22" name="Group 21">
+            <a:extLst>
+              <a:ext uri="{FF2B5EF4-FFF2-40B4-BE49-F238E27FC236}">
+                <a16:creationId xmlns:a16="http://schemas.microsoft.com/office/drawing/2014/main" id="{AED197FB-34A4-2A4D-9C93-7A17A0E7FBEF}"/>
+              </a:ext>
+            </a:extLst>
+          </p:cNvPr>
+          <p:cNvGrpSpPr/>
+          <p:nvPr/>
+        </p:nvGrpSpPr>
+        <p:grpSpPr>
+          <a:xfrm>
+            <a:off x="130628" y="0"/>
+            <a:ext cx="7053943" cy="7315200"/>
+            <a:chOff x="130628" y="0"/>
+            <a:chExt cx="7053943" cy="7315200"/>
+          </a:xfrm>
+        </p:grpSpPr>
+        <p:pic>
+          <p:nvPicPr>
+            <p:cNvPr id="11" name="Picture 10">
+              <a:extLst>
+                <a:ext uri="{FF2B5EF4-FFF2-40B4-BE49-F238E27FC236}">
+                  <a16:creationId xmlns:a16="http://schemas.microsoft.com/office/drawing/2014/main" id="{50D9A207-13B0-B041-87D9-BA76E2BFB4E9}"/>
+                </a:ext>
+              </a:extLst>
+            </p:cNvPr>
+            <p:cNvPicPr>
+              <a:picLocks noChangeAspect="1"/>
+            </p:cNvPicPr>
+            <p:nvPr/>
+          </p:nvPicPr>
+          <p:blipFill>
+            <a:blip r:embed="rId2"/>
+            <a:stretch>
+              <a:fillRect/>
+            </a:stretch>
+          </p:blipFill>
+          <p:spPr>
+            <a:xfrm>
+              <a:off x="130628" y="0"/>
+              <a:ext cx="7053943" cy="7315200"/>
+            </a:xfrm>
+            <a:prstGeom prst="rect">
+              <a:avLst/>
+            </a:prstGeom>
+          </p:spPr>
+        </p:pic>
+        <p:sp>
+          <p:nvSpPr>
+            <p:cNvPr id="12" name="Oval 11">
+              <a:extLst>
+                <a:ext uri="{FF2B5EF4-FFF2-40B4-BE49-F238E27FC236}">
+                  <a16:creationId xmlns:a16="http://schemas.microsoft.com/office/drawing/2014/main" id="{3CA1C9FF-A862-B443-8F4F-AC43582AB489}"/>
+                </a:ext>
+              </a:extLst>
+            </p:cNvPr>
+            <p:cNvSpPr/>
+            <p:nvPr/>
+          </p:nvSpPr>
+          <p:spPr>
+            <a:xfrm>
+              <a:off x="2821577" y="496389"/>
+              <a:ext cx="278674" cy="269966"/>
+            </a:xfrm>
+            <a:prstGeom prst="ellipse">
+              <a:avLst/>
+            </a:prstGeom>
+            <a:solidFill>
+              <a:schemeClr val="accent1">
+                <a:lumMod val="60000"/>
+                <a:lumOff val="40000"/>
+                <a:alpha val="39608"/>
+              </a:schemeClr>
+            </a:solidFill>
+            <a:ln>
+              <a:solidFill>
+                <a:schemeClr val="accent1">
+                  <a:lumMod val="60000"/>
+                  <a:lumOff val="40000"/>
+                </a:schemeClr>
+              </a:solidFill>
+            </a:ln>
+          </p:spPr>
+          <p:style>
+            <a:lnRef idx="2">
+              <a:schemeClr val="accent1">
+                <a:shade val="50000"/>
+              </a:schemeClr>
+            </a:lnRef>
+            <a:fillRef idx="1">
+              <a:schemeClr val="accent1"/>
+            </a:fillRef>
+            <a:effectRef idx="0">
+              <a:schemeClr val="accent1"/>
+            </a:effectRef>
+            <a:fontRef idx="minor">
+              <a:schemeClr val="lt1"/>
+            </a:fontRef>
+          </p:style>
+          <p:txBody>
+            <a:bodyPr rtlCol="0" anchor="ctr"/>
+            <a:lstStyle/>
+            <a:p>
+              <a:pPr algn="ctr"/>
+              <a:endParaRPr lang="en-US"/>
+            </a:p>
+          </p:txBody>
+        </p:sp>
+        <p:sp>
+          <p:nvSpPr>
+            <p:cNvPr id="15" name="Oval 14">
+              <a:extLst>
+                <a:ext uri="{FF2B5EF4-FFF2-40B4-BE49-F238E27FC236}">
+                  <a16:creationId xmlns:a16="http://schemas.microsoft.com/office/drawing/2014/main" id="{F4D6F14E-5B8A-AD4D-AE47-20EE8FCC05E7}"/>
+                </a:ext>
+              </a:extLst>
+            </p:cNvPr>
+            <p:cNvSpPr/>
+            <p:nvPr/>
+          </p:nvSpPr>
+          <p:spPr>
+            <a:xfrm>
+              <a:off x="1058092" y="1328057"/>
+              <a:ext cx="278674" cy="269966"/>
+            </a:xfrm>
+            <a:prstGeom prst="ellipse">
+              <a:avLst/>
+            </a:prstGeom>
+            <a:solidFill>
+              <a:schemeClr val="accent4">
+                <a:lumMod val="60000"/>
+                <a:lumOff val="40000"/>
+                <a:alpha val="39608"/>
+              </a:schemeClr>
+            </a:solidFill>
+            <a:ln>
+              <a:solidFill>
+                <a:schemeClr val="accent4">
+                  <a:lumMod val="60000"/>
+                  <a:lumOff val="40000"/>
+                </a:schemeClr>
+              </a:solidFill>
+            </a:ln>
+          </p:spPr>
+          <p:style>
+            <a:lnRef idx="2">
+              <a:schemeClr val="accent1">
+                <a:shade val="50000"/>
+              </a:schemeClr>
+            </a:lnRef>
+            <a:fillRef idx="1">
+              <a:schemeClr val="accent1"/>
+            </a:fillRef>
+            <a:effectRef idx="0">
+              <a:schemeClr val="accent1"/>
+            </a:effectRef>
+            <a:fontRef idx="minor">
+              <a:schemeClr val="lt1"/>
+            </a:fontRef>
+          </p:style>
+          <p:txBody>
+            <a:bodyPr rtlCol="0" anchor="ctr"/>
+            <a:lstStyle/>
+            <a:p>
+              <a:pPr algn="ctr"/>
+              <a:endParaRPr lang="en-US"/>
+            </a:p>
+          </p:txBody>
+        </p:sp>
+        <p:sp>
+          <p:nvSpPr>
+            <p:cNvPr id="18" name="Oval 17">
+              <a:extLst>
+                <a:ext uri="{FF2B5EF4-FFF2-40B4-BE49-F238E27FC236}">
+                  <a16:creationId xmlns:a16="http://schemas.microsoft.com/office/drawing/2014/main" id="{43C9429A-E35E-1046-A4FB-02BB252F3F8F}"/>
+                </a:ext>
+              </a:extLst>
+            </p:cNvPr>
+            <p:cNvSpPr/>
+            <p:nvPr/>
+          </p:nvSpPr>
+          <p:spPr>
+            <a:xfrm>
+              <a:off x="4753429" y="6253570"/>
+              <a:ext cx="278674" cy="269966"/>
+            </a:xfrm>
+            <a:prstGeom prst="ellipse">
+              <a:avLst/>
+            </a:prstGeom>
+            <a:solidFill>
+              <a:schemeClr val="accent6">
+                <a:lumMod val="50000"/>
+                <a:alpha val="39608"/>
+              </a:schemeClr>
+            </a:solidFill>
+            <a:ln>
+              <a:solidFill>
+                <a:schemeClr val="accent6">
+                  <a:lumMod val="50000"/>
+                </a:schemeClr>
+              </a:solidFill>
+            </a:ln>
+          </p:spPr>
+          <p:style>
+            <a:lnRef idx="2">
+              <a:schemeClr val="accent1">
+                <a:shade val="50000"/>
+              </a:schemeClr>
+            </a:lnRef>
+            <a:fillRef idx="1">
+              <a:schemeClr val="accent1"/>
+            </a:fillRef>
+            <a:effectRef idx="0">
+              <a:schemeClr val="accent1"/>
+            </a:effectRef>
+            <a:fontRef idx="minor">
+              <a:schemeClr val="lt1"/>
+            </a:fontRef>
+          </p:style>
+          <p:txBody>
+            <a:bodyPr rtlCol="0" anchor="ctr"/>
+            <a:lstStyle/>
+            <a:p>
+              <a:pPr algn="ctr"/>
+              <a:endParaRPr lang="en-US"/>
+            </a:p>
+          </p:txBody>
+        </p:sp>
+        <p:sp>
+          <p:nvSpPr>
+            <p:cNvPr id="19" name="Oval 18">
+              <a:extLst>
+                <a:ext uri="{FF2B5EF4-FFF2-40B4-BE49-F238E27FC236}">
+                  <a16:creationId xmlns:a16="http://schemas.microsoft.com/office/drawing/2014/main" id="{278BFD91-952E-1C4C-A54B-D640A4D25C2C}"/>
+                </a:ext>
+              </a:extLst>
+            </p:cNvPr>
+            <p:cNvSpPr/>
+            <p:nvPr/>
+          </p:nvSpPr>
+          <p:spPr>
+            <a:xfrm>
+              <a:off x="5842454" y="4847045"/>
+              <a:ext cx="278674" cy="269966"/>
+            </a:xfrm>
+            <a:prstGeom prst="ellipse">
+              <a:avLst/>
+            </a:prstGeom>
+            <a:solidFill>
+              <a:schemeClr val="accent1">
+                <a:lumMod val="75000"/>
+                <a:alpha val="39608"/>
+              </a:schemeClr>
+            </a:solidFill>
+            <a:ln>
+              <a:solidFill>
+                <a:schemeClr val="accent1">
+                  <a:lumMod val="75000"/>
+                </a:schemeClr>
+              </a:solidFill>
+            </a:ln>
+          </p:spPr>
+          <p:style>
+            <a:lnRef idx="2">
+              <a:schemeClr val="accent1">
+                <a:shade val="50000"/>
+              </a:schemeClr>
+            </a:lnRef>
+            <a:fillRef idx="1">
+              <a:schemeClr val="accent1"/>
+            </a:fillRef>
+            <a:effectRef idx="0">
+              <a:schemeClr val="accent1"/>
+            </a:effectRef>
+            <a:fontRef idx="minor">
+              <a:schemeClr val="lt1"/>
+            </a:fontRef>
+          </p:style>
+          <p:txBody>
+            <a:bodyPr rtlCol="0" anchor="ctr"/>
+            <a:lstStyle/>
+            <a:p>
+              <a:pPr algn="ctr"/>
+              <a:endParaRPr lang="en-US"/>
+            </a:p>
+          </p:txBody>
+        </p:sp>
+        <p:sp>
+          <p:nvSpPr>
+            <p:cNvPr id="20" name="Oval 19">
+              <a:extLst>
+                <a:ext uri="{FF2B5EF4-FFF2-40B4-BE49-F238E27FC236}">
+                  <a16:creationId xmlns:a16="http://schemas.microsoft.com/office/drawing/2014/main" id="{C0D3AAEA-D9D7-7E4F-B605-A917B1A0FCCC}"/>
+                </a:ext>
+              </a:extLst>
+            </p:cNvPr>
+            <p:cNvSpPr/>
+            <p:nvPr/>
+          </p:nvSpPr>
+          <p:spPr>
+            <a:xfrm>
+              <a:off x="4529727" y="2322014"/>
+              <a:ext cx="278674" cy="269966"/>
+            </a:xfrm>
+            <a:prstGeom prst="ellipse">
+              <a:avLst/>
+            </a:prstGeom>
+            <a:solidFill>
+              <a:schemeClr val="accent2">
+                <a:lumMod val="75000"/>
+                <a:alpha val="39608"/>
+              </a:schemeClr>
+            </a:solidFill>
+            <a:ln>
+              <a:solidFill>
+                <a:schemeClr val="accent2">
+                  <a:lumMod val="75000"/>
+                </a:schemeClr>
+              </a:solidFill>
+            </a:ln>
+          </p:spPr>
+          <p:style>
+            <a:lnRef idx="2">
+              <a:schemeClr val="accent1">
+                <a:shade val="50000"/>
+              </a:schemeClr>
+            </a:lnRef>
+            <a:fillRef idx="1">
+              <a:schemeClr val="accent1"/>
+            </a:fillRef>
+            <a:effectRef idx="0">
+              <a:schemeClr val="accent1"/>
+            </a:effectRef>
+            <a:fontRef idx="minor">
+              <a:schemeClr val="lt1"/>
+            </a:fontRef>
+          </p:style>
+          <p:txBody>
+            <a:bodyPr rtlCol="0" anchor="ctr"/>
+            <a:lstStyle/>
+            <a:p>
+              <a:pPr algn="ctr"/>
+              <a:endParaRPr lang="en-US"/>
+            </a:p>
+          </p:txBody>
+        </p:sp>
+      </p:grpSp>
+      <p:sp>
+        <p:nvSpPr>
+          <p:cNvPr id="23" name="TextBox 22">
+            <a:extLst>
+              <a:ext uri="{FF2B5EF4-FFF2-40B4-BE49-F238E27FC236}">
+                <a16:creationId xmlns:a16="http://schemas.microsoft.com/office/drawing/2014/main" id="{FA82E9AD-0167-CF4D-BC21-ABF1A6263315}"/>
+              </a:ext>
+            </a:extLst>
+          </p:cNvPr>
+          <p:cNvSpPr txBox="1"/>
+          <p:nvPr/>
+        </p:nvSpPr>
+        <p:spPr>
+          <a:xfrm>
+            <a:off x="3100251" y="496389"/>
+            <a:ext cx="1030424" cy="276999"/>
+          </a:xfrm>
+          <a:prstGeom prst="rect">
+            <a:avLst/>
+          </a:prstGeom>
+          <a:noFill/>
+        </p:spPr>
+        <p:txBody>
+          <a:bodyPr wrap="square" rtlCol="0">
+            <a:spAutoFit/>
+          </a:bodyPr>
+          <a:lstStyle/>
+          <a:p>
+            <a:r>
+              <a:rPr lang="en-US" sz="1200" b="1" dirty="0">
+                <a:latin typeface="Arial" panose="020B0604020202020204" pitchFamily="34" charset="0"/>
+                <a:cs typeface="Arial" panose="020B0604020202020204" pitchFamily="34" charset="0"/>
+              </a:rPr>
+              <a:t>ST8, ST239</a:t>
+            </a:r>
+          </a:p>
+        </p:txBody>
+      </p:sp>
+      <p:sp>
+        <p:nvSpPr>
+          <p:cNvPr id="25" name="TextBox 24">
+            <a:extLst>
+              <a:ext uri="{FF2B5EF4-FFF2-40B4-BE49-F238E27FC236}">
+                <a16:creationId xmlns:a16="http://schemas.microsoft.com/office/drawing/2014/main" id="{23D9265C-156F-5249-A311-30E43A562ACF}"/>
+              </a:ext>
+            </a:extLst>
+          </p:cNvPr>
+          <p:cNvSpPr txBox="1"/>
+          <p:nvPr/>
+        </p:nvSpPr>
+        <p:spPr>
+          <a:xfrm>
+            <a:off x="130628" y="1321024"/>
+            <a:ext cx="1166950" cy="276999"/>
+          </a:xfrm>
+          <a:prstGeom prst="rect">
+            <a:avLst/>
+          </a:prstGeom>
+          <a:noFill/>
+        </p:spPr>
+        <p:txBody>
+          <a:bodyPr wrap="square" rtlCol="0">
+            <a:spAutoFit/>
+          </a:bodyPr>
+          <a:lstStyle/>
+          <a:p>
+            <a:r>
+              <a:rPr lang="en-US" sz="1200" b="1" dirty="0">
+                <a:latin typeface="Arial" panose="020B0604020202020204" pitchFamily="34" charset="0"/>
+                <a:cs typeface="Arial" panose="020B0604020202020204" pitchFamily="34" charset="0"/>
+              </a:rPr>
+              <a:t>ST5, ST105</a:t>
+            </a:r>
+          </a:p>
+        </p:txBody>
+      </p:sp>
+      <p:sp>
+        <p:nvSpPr>
+          <p:cNvPr id="26" name="TextBox 25">
+            <a:extLst>
+              <a:ext uri="{FF2B5EF4-FFF2-40B4-BE49-F238E27FC236}">
+                <a16:creationId xmlns:a16="http://schemas.microsoft.com/office/drawing/2014/main" id="{2B0003EF-FFB9-5047-8AF7-BCBCDD34CC7B}"/>
+              </a:ext>
+            </a:extLst>
+          </p:cNvPr>
+          <p:cNvSpPr txBox="1"/>
+          <p:nvPr/>
+        </p:nvSpPr>
+        <p:spPr>
+          <a:xfrm>
+            <a:off x="4786630" y="2318497"/>
+            <a:ext cx="731520" cy="276999"/>
+          </a:xfrm>
+          <a:prstGeom prst="rect">
+            <a:avLst/>
+          </a:prstGeom>
+          <a:noFill/>
+        </p:spPr>
+        <p:txBody>
+          <a:bodyPr wrap="square" rtlCol="0">
+            <a:spAutoFit/>
+          </a:bodyPr>
+          <a:lstStyle/>
+          <a:p>
+            <a:r>
+              <a:rPr lang="en-US" sz="1200" b="1" dirty="0">
+                <a:latin typeface="Arial" panose="020B0604020202020204" pitchFamily="34" charset="0"/>
+                <a:cs typeface="Arial" panose="020B0604020202020204" pitchFamily="34" charset="0"/>
+              </a:rPr>
+              <a:t>ST22</a:t>
+            </a:r>
+          </a:p>
+        </p:txBody>
+      </p:sp>
+      <p:sp>
+        <p:nvSpPr>
+          <p:cNvPr id="27" name="TextBox 26">
+            <a:extLst>
+              <a:ext uri="{FF2B5EF4-FFF2-40B4-BE49-F238E27FC236}">
+                <a16:creationId xmlns:a16="http://schemas.microsoft.com/office/drawing/2014/main" id="{57261D83-7E2A-FC46-A297-2F964A02E596}"/>
+              </a:ext>
+            </a:extLst>
+          </p:cNvPr>
+          <p:cNvSpPr txBox="1"/>
+          <p:nvPr/>
+        </p:nvSpPr>
+        <p:spPr>
+          <a:xfrm>
+            <a:off x="6121128" y="4840012"/>
+            <a:ext cx="731520" cy="276999"/>
+          </a:xfrm>
+          <a:prstGeom prst="rect">
+            <a:avLst/>
+          </a:prstGeom>
+          <a:noFill/>
+        </p:spPr>
+        <p:txBody>
+          <a:bodyPr wrap="square" rtlCol="0">
+            <a:spAutoFit/>
+          </a:bodyPr>
+          <a:lstStyle/>
+          <a:p>
+            <a:r>
+              <a:rPr lang="en-US" sz="1200" b="1" dirty="0">
+                <a:latin typeface="Arial" panose="020B0604020202020204" pitchFamily="34" charset="0"/>
+                <a:cs typeface="Arial" panose="020B0604020202020204" pitchFamily="34" charset="0"/>
+              </a:rPr>
+              <a:t>ST45</a:t>
+            </a:r>
+          </a:p>
+        </p:txBody>
+      </p:sp>
+      <p:sp>
+        <p:nvSpPr>
+          <p:cNvPr id="28" name="TextBox 27">
+            <a:extLst>
+              <a:ext uri="{FF2B5EF4-FFF2-40B4-BE49-F238E27FC236}">
+                <a16:creationId xmlns:a16="http://schemas.microsoft.com/office/drawing/2014/main" id="{F410C2B2-FDC3-EB4B-848C-A46855FBA176}"/>
+              </a:ext>
+            </a:extLst>
+          </p:cNvPr>
+          <p:cNvSpPr txBox="1"/>
+          <p:nvPr/>
+        </p:nvSpPr>
+        <p:spPr>
+          <a:xfrm>
+            <a:off x="5032103" y="6246537"/>
+            <a:ext cx="1009922" cy="276999"/>
+          </a:xfrm>
+          <a:prstGeom prst="rect">
+            <a:avLst/>
+          </a:prstGeom>
+          <a:noFill/>
+        </p:spPr>
+        <p:txBody>
+          <a:bodyPr wrap="square" rtlCol="0">
+            <a:spAutoFit/>
+          </a:bodyPr>
+          <a:lstStyle/>
+          <a:p>
+            <a:r>
+              <a:rPr lang="en-US" sz="1200" b="1" dirty="0">
+                <a:latin typeface="Arial" panose="020B0604020202020204" pitchFamily="34" charset="0"/>
+                <a:cs typeface="Arial" panose="020B0604020202020204" pitchFamily="34" charset="0"/>
+              </a:rPr>
+              <a:t>ST30, ST36</a:t>
+            </a:r>
+          </a:p>
+        </p:txBody>
+      </p:sp>
+      <p:sp>
+        <p:nvSpPr>
+          <p:cNvPr id="31" name="Oval 30">
+            <a:extLst>
+              <a:ext uri="{FF2B5EF4-FFF2-40B4-BE49-F238E27FC236}">
+                <a16:creationId xmlns:a16="http://schemas.microsoft.com/office/drawing/2014/main" id="{88E750EB-1EBE-3245-8A8A-61254760C603}"/>
+              </a:ext>
+            </a:extLst>
+          </p:cNvPr>
+          <p:cNvSpPr/>
+          <p:nvPr/>
+        </p:nvSpPr>
+        <p:spPr>
+          <a:xfrm>
+            <a:off x="5397863" y="5602919"/>
+            <a:ext cx="278674" cy="269966"/>
+          </a:xfrm>
+          <a:prstGeom prst="ellipse">
+            <a:avLst/>
+          </a:prstGeom>
+          <a:solidFill>
+            <a:srgbClr val="FF0000">
+              <a:alpha val="39608"/>
+            </a:srgbClr>
+          </a:solidFill>
+          <a:ln>
+            <a:solidFill>
+              <a:srgbClr val="FF0000"/>
+            </a:solidFill>
+          </a:ln>
+        </p:spPr>
+        <p:style>
+          <a:lnRef idx="2">
+            <a:schemeClr val="accent1">
+              <a:shade val="50000"/>
+            </a:schemeClr>
+          </a:lnRef>
+          <a:fillRef idx="1">
+            <a:schemeClr val="accent1"/>
+          </a:fillRef>
+          <a:effectRef idx="0">
+            <a:schemeClr val="accent1"/>
+          </a:effectRef>
+          <a:fontRef idx="minor">
+            <a:schemeClr val="lt1"/>
+          </a:fontRef>
+        </p:style>
+        <p:txBody>
+          <a:bodyPr rtlCol="0" anchor="ctr"/>
+          <a:lstStyle/>
+          <a:p>
+            <a:pPr algn="ctr"/>
+            <a:endParaRPr lang="en-US"/>
+          </a:p>
+        </p:txBody>
+      </p:sp>
+      <p:sp>
+        <p:nvSpPr>
+          <p:cNvPr id="32" name="TextBox 31">
+            <a:extLst>
+              <a:ext uri="{FF2B5EF4-FFF2-40B4-BE49-F238E27FC236}">
+                <a16:creationId xmlns:a16="http://schemas.microsoft.com/office/drawing/2014/main" id="{D22D76FA-FB07-DD4F-9573-F231B2732E97}"/>
+              </a:ext>
+            </a:extLst>
+          </p:cNvPr>
+          <p:cNvSpPr txBox="1"/>
+          <p:nvPr/>
+        </p:nvSpPr>
+        <p:spPr>
+          <a:xfrm>
+            <a:off x="5676537" y="5595886"/>
+            <a:ext cx="731520" cy="276999"/>
+          </a:xfrm>
+          <a:prstGeom prst="rect">
+            <a:avLst/>
+          </a:prstGeom>
+          <a:noFill/>
+        </p:spPr>
+        <p:txBody>
+          <a:bodyPr wrap="square" rtlCol="0">
+            <a:spAutoFit/>
+          </a:bodyPr>
+          <a:lstStyle/>
+          <a:p>
+            <a:r>
+              <a:rPr lang="en-US" sz="1200" b="1" dirty="0">
+                <a:latin typeface="Arial" panose="020B0604020202020204" pitchFamily="34" charset="0"/>
+                <a:cs typeface="Arial" panose="020B0604020202020204" pitchFamily="34" charset="0"/>
+              </a:rPr>
+              <a:t>ST398</a:t>
+            </a:r>
+          </a:p>
+        </p:txBody>
+      </p:sp>
+      <p:sp>
+        <p:nvSpPr>
+          <p:cNvPr id="33" name="Oval 32">
+            <a:extLst>
+              <a:ext uri="{FF2B5EF4-FFF2-40B4-BE49-F238E27FC236}">
+                <a16:creationId xmlns:a16="http://schemas.microsoft.com/office/drawing/2014/main" id="{46DAEB19-745E-9F41-B3C3-F3CF7FD577F8}"/>
+              </a:ext>
+            </a:extLst>
+          </p:cNvPr>
+          <p:cNvSpPr/>
+          <p:nvPr/>
+        </p:nvSpPr>
+        <p:spPr>
+          <a:xfrm>
+            <a:off x="2355669" y="413658"/>
+            <a:ext cx="278674" cy="269966"/>
+          </a:xfrm>
+          <a:prstGeom prst="ellipse">
+            <a:avLst/>
+          </a:prstGeom>
+          <a:solidFill>
+            <a:srgbClr val="A74E5D">
+              <a:alpha val="39608"/>
+            </a:srgbClr>
+          </a:solidFill>
+          <a:ln>
+            <a:solidFill>
+              <a:srgbClr val="A74E5D"/>
+            </a:solidFill>
+          </a:ln>
+        </p:spPr>
+        <p:style>
+          <a:lnRef idx="2">
+            <a:schemeClr val="accent1">
+              <a:shade val="50000"/>
+            </a:schemeClr>
+          </a:lnRef>
+          <a:fillRef idx="1">
+            <a:schemeClr val="accent1"/>
+          </a:fillRef>
+          <a:effectRef idx="0">
+            <a:schemeClr val="accent1"/>
+          </a:effectRef>
+          <a:fontRef idx="minor">
+            <a:schemeClr val="lt1"/>
+          </a:fontRef>
+        </p:style>
+        <p:txBody>
+          <a:bodyPr rtlCol="0" anchor="ctr"/>
+          <a:lstStyle/>
+          <a:p>
+            <a:pPr algn="ctr"/>
+            <a:endParaRPr lang="en-US"/>
+          </a:p>
+        </p:txBody>
+      </p:sp>
+      <p:sp>
+        <p:nvSpPr>
+          <p:cNvPr id="34" name="TextBox 33">
+            <a:extLst>
+              <a:ext uri="{FF2B5EF4-FFF2-40B4-BE49-F238E27FC236}">
+                <a16:creationId xmlns:a16="http://schemas.microsoft.com/office/drawing/2014/main" id="{D856C469-33D0-4D4E-8D81-3FFF17DE8804}"/>
+              </a:ext>
+            </a:extLst>
+          </p:cNvPr>
+          <p:cNvSpPr txBox="1"/>
+          <p:nvPr/>
+        </p:nvSpPr>
+        <p:spPr>
+          <a:xfrm>
+            <a:off x="2477589" y="234479"/>
+            <a:ext cx="731520" cy="276999"/>
+          </a:xfrm>
+          <a:prstGeom prst="rect">
+            <a:avLst/>
+          </a:prstGeom>
+          <a:noFill/>
+        </p:spPr>
+        <p:txBody>
+          <a:bodyPr wrap="square" rtlCol="0">
+            <a:spAutoFit/>
+          </a:bodyPr>
+          <a:lstStyle/>
+          <a:p>
+            <a:r>
+              <a:rPr lang="en-US" sz="1200" b="1" dirty="0">
+                <a:latin typeface="Arial" panose="020B0604020202020204" pitchFamily="34" charset="0"/>
+                <a:cs typeface="Arial" panose="020B0604020202020204" pitchFamily="34" charset="0"/>
+              </a:rPr>
+              <a:t>ST15</a:t>
+            </a:r>
+          </a:p>
+        </p:txBody>
+      </p:sp>
+    </p:spTree>
+    <p:extLst>
+      <p:ext uri="{BB962C8B-B14F-4D97-AF65-F5344CB8AC3E}">
+        <p14:creationId xmlns:p14="http://schemas.microsoft.com/office/powerpoint/2010/main" val="3625486768"/>
       </p:ext>
     </p:extLst>
   </p:cSld>

</xml_diff>

<commit_message>
updated phylogeny with final iq-tree output
</commit_message>
<xml_diff>
--- a/data/nrd/nrd-annotated-phylogeny.pptx
+++ b/data/nrd/nrd-annotated-phylogeny.pptx
@@ -2,20 +2,20 @@
 <file path=ppt/presentation.xml><?xml version="1.0" encoding="utf-8"?>
 <p:presentation xmlns:a="http://schemas.openxmlformats.org/drawingml/2006/main" xmlns:r="http://schemas.openxmlformats.org/officeDocument/2006/relationships" xmlns:p="http://schemas.openxmlformats.org/presentationml/2006/main" saveSubsetFonts="1" autoCompressPictures="0">
   <p:sldMasterIdLst>
-    <p:sldMasterId id="2147483696" r:id="rId1"/>
+    <p:sldMasterId id="2147483828" r:id="rId1"/>
   </p:sldMasterIdLst>
   <p:sldIdLst>
-    <p:sldId id="256" r:id="rId2"/>
-    <p:sldId id="257" r:id="rId3"/>
+    <p:sldId id="258" r:id="rId2"/>
+    <p:sldId id="256" r:id="rId3"/>
   </p:sldIdLst>
-  <p:sldSz cx="7315200" cy="7315200"/>
+  <p:sldSz cx="10058400" cy="10058400"/>
   <p:notesSz cx="6858000" cy="9144000"/>
   <p:defaultTextStyle>
     <a:defPPr>
       <a:defRPr lang="en-US"/>
     </a:defPPr>
-    <a:lvl1pPr marL="0" algn="l" defTabSz="914400" rtl="0" eaLnBrk="1" latinLnBrk="0" hangingPunct="1">
-      <a:defRPr sz="1800" kern="1200">
+    <a:lvl1pPr marL="0" algn="l" defTabSz="1080698" rtl="0" eaLnBrk="1" latinLnBrk="0" hangingPunct="1">
+      <a:defRPr sz="2127" kern="1200">
         <a:solidFill>
           <a:schemeClr val="tx1"/>
         </a:solidFill>
@@ -24,8 +24,8 @@
         <a:cs typeface="+mn-cs"/>
       </a:defRPr>
     </a:lvl1pPr>
-    <a:lvl2pPr marL="457200" algn="l" defTabSz="914400" rtl="0" eaLnBrk="1" latinLnBrk="0" hangingPunct="1">
-      <a:defRPr sz="1800" kern="1200">
+    <a:lvl2pPr marL="540350" algn="l" defTabSz="1080698" rtl="0" eaLnBrk="1" latinLnBrk="0" hangingPunct="1">
+      <a:defRPr sz="2127" kern="1200">
         <a:solidFill>
           <a:schemeClr val="tx1"/>
         </a:solidFill>
@@ -34,8 +34,8 @@
         <a:cs typeface="+mn-cs"/>
       </a:defRPr>
     </a:lvl2pPr>
-    <a:lvl3pPr marL="914400" algn="l" defTabSz="914400" rtl="0" eaLnBrk="1" latinLnBrk="0" hangingPunct="1">
-      <a:defRPr sz="1800" kern="1200">
+    <a:lvl3pPr marL="1080698" algn="l" defTabSz="1080698" rtl="0" eaLnBrk="1" latinLnBrk="0" hangingPunct="1">
+      <a:defRPr sz="2127" kern="1200">
         <a:solidFill>
           <a:schemeClr val="tx1"/>
         </a:solidFill>
@@ -44,8 +44,8 @@
         <a:cs typeface="+mn-cs"/>
       </a:defRPr>
     </a:lvl3pPr>
-    <a:lvl4pPr marL="1371600" algn="l" defTabSz="914400" rtl="0" eaLnBrk="1" latinLnBrk="0" hangingPunct="1">
-      <a:defRPr sz="1800" kern="1200">
+    <a:lvl4pPr marL="1621047" algn="l" defTabSz="1080698" rtl="0" eaLnBrk="1" latinLnBrk="0" hangingPunct="1">
+      <a:defRPr sz="2127" kern="1200">
         <a:solidFill>
           <a:schemeClr val="tx1"/>
         </a:solidFill>
@@ -54,8 +54,8 @@
         <a:cs typeface="+mn-cs"/>
       </a:defRPr>
     </a:lvl4pPr>
-    <a:lvl5pPr marL="1828800" algn="l" defTabSz="914400" rtl="0" eaLnBrk="1" latinLnBrk="0" hangingPunct="1">
-      <a:defRPr sz="1800" kern="1200">
+    <a:lvl5pPr marL="2161397" algn="l" defTabSz="1080698" rtl="0" eaLnBrk="1" latinLnBrk="0" hangingPunct="1">
+      <a:defRPr sz="2127" kern="1200">
         <a:solidFill>
           <a:schemeClr val="tx1"/>
         </a:solidFill>
@@ -64,8 +64,8 @@
         <a:cs typeface="+mn-cs"/>
       </a:defRPr>
     </a:lvl5pPr>
-    <a:lvl6pPr marL="2286000" algn="l" defTabSz="914400" rtl="0" eaLnBrk="1" latinLnBrk="0" hangingPunct="1">
-      <a:defRPr sz="1800" kern="1200">
+    <a:lvl6pPr marL="2701746" algn="l" defTabSz="1080698" rtl="0" eaLnBrk="1" latinLnBrk="0" hangingPunct="1">
+      <a:defRPr sz="2127" kern="1200">
         <a:solidFill>
           <a:schemeClr val="tx1"/>
         </a:solidFill>
@@ -74,8 +74,8 @@
         <a:cs typeface="+mn-cs"/>
       </a:defRPr>
     </a:lvl6pPr>
-    <a:lvl7pPr marL="2743200" algn="l" defTabSz="914400" rtl="0" eaLnBrk="1" latinLnBrk="0" hangingPunct="1">
-      <a:defRPr sz="1800" kern="1200">
+    <a:lvl7pPr marL="3242095" algn="l" defTabSz="1080698" rtl="0" eaLnBrk="1" latinLnBrk="0" hangingPunct="1">
+      <a:defRPr sz="2127" kern="1200">
         <a:solidFill>
           <a:schemeClr val="tx1"/>
         </a:solidFill>
@@ -84,8 +84,8 @@
         <a:cs typeface="+mn-cs"/>
       </a:defRPr>
     </a:lvl7pPr>
-    <a:lvl8pPr marL="3200400" algn="l" defTabSz="914400" rtl="0" eaLnBrk="1" latinLnBrk="0" hangingPunct="1">
-      <a:defRPr sz="1800" kern="1200">
+    <a:lvl8pPr marL="3782445" algn="l" defTabSz="1080698" rtl="0" eaLnBrk="1" latinLnBrk="0" hangingPunct="1">
+      <a:defRPr sz="2127" kern="1200">
         <a:solidFill>
           <a:schemeClr val="tx1"/>
         </a:solidFill>
@@ -94,8 +94,8 @@
         <a:cs typeface="+mn-cs"/>
       </a:defRPr>
     </a:lvl8pPr>
-    <a:lvl9pPr marL="3657600" algn="l" defTabSz="914400" rtl="0" eaLnBrk="1" latinLnBrk="0" hangingPunct="1">
-      <a:defRPr sz="1800" kern="1200">
+    <a:lvl9pPr marL="4322791" algn="l" defTabSz="1080698" rtl="0" eaLnBrk="1" latinLnBrk="0" hangingPunct="1">
+      <a:defRPr sz="2127" kern="1200">
         <a:solidFill>
           <a:schemeClr val="tx1"/>
         </a:solidFill>
@@ -108,12 +108,12 @@
   <p:extLst>
     <p:ext uri="{EFAFB233-063F-42B5-8137-9DF3F51BA10A}">
       <p15:sldGuideLst xmlns:p15="http://schemas.microsoft.com/office/powerpoint/2012/main">
-        <p15:guide id="1" orient="horz" pos="2304" userDrawn="1">
+        <p15:guide id="1" orient="horz" pos="3168" userDrawn="1">
           <p15:clr>
             <a:srgbClr val="A4A3A4"/>
           </p15:clr>
         </p15:guide>
-        <p15:guide id="2" pos="2304" userDrawn="1">
+        <p15:guide id="2" pos="3168" userDrawn="1">
           <p15:clr>
             <a:srgbClr val="A4A3A4"/>
           </p15:clr>
@@ -153,15 +153,15 @@
         </p:nvSpPr>
         <p:spPr>
           <a:xfrm>
-            <a:off x="548640" y="1197187"/>
-            <a:ext cx="6217920" cy="2546773"/>
+            <a:off x="754380" y="1646133"/>
+            <a:ext cx="8549640" cy="3501813"/>
           </a:xfrm>
         </p:spPr>
         <p:txBody>
           <a:bodyPr anchor="b"/>
           <a:lstStyle>
             <a:lvl1pPr algn="ctr">
-              <a:defRPr sz="4800"/>
+              <a:defRPr sz="6600"/>
             </a:lvl1pPr>
           </a:lstStyle>
           <a:p>
@@ -185,8 +185,8 @@
         </p:nvSpPr>
         <p:spPr>
           <a:xfrm>
-            <a:off x="914400" y="3842174"/>
-            <a:ext cx="5486400" cy="1766146"/>
+            <a:off x="1257300" y="5282989"/>
+            <a:ext cx="7543800" cy="2428451"/>
           </a:xfrm>
         </p:spPr>
         <p:txBody>
@@ -194,39 +194,39 @@
           <a:lstStyle>
             <a:lvl1pPr marL="0" indent="0" algn="ctr">
               <a:buNone/>
-              <a:defRPr sz="1920"/>
+              <a:defRPr sz="2640"/>
             </a:lvl1pPr>
-            <a:lvl2pPr marL="365760" indent="0" algn="ctr">
-              <a:buNone/>
-              <a:defRPr sz="1600"/>
+            <a:lvl2pPr marL="502920" indent="0" algn="ctr">
+              <a:buNone/>
+              <a:defRPr sz="2200"/>
             </a:lvl2pPr>
-            <a:lvl3pPr marL="731520" indent="0" algn="ctr">
-              <a:buNone/>
-              <a:defRPr sz="1440"/>
+            <a:lvl3pPr marL="1005840" indent="0" algn="ctr">
+              <a:buNone/>
+              <a:defRPr sz="1980"/>
             </a:lvl3pPr>
-            <a:lvl4pPr marL="1097280" indent="0" algn="ctr">
-              <a:buNone/>
-              <a:defRPr sz="1280"/>
+            <a:lvl4pPr marL="1508760" indent="0" algn="ctr">
+              <a:buNone/>
+              <a:defRPr sz="1760"/>
             </a:lvl4pPr>
-            <a:lvl5pPr marL="1463040" indent="0" algn="ctr">
-              <a:buNone/>
-              <a:defRPr sz="1280"/>
+            <a:lvl5pPr marL="2011680" indent="0" algn="ctr">
+              <a:buNone/>
+              <a:defRPr sz="1760"/>
             </a:lvl5pPr>
-            <a:lvl6pPr marL="1828800" indent="0" algn="ctr">
-              <a:buNone/>
-              <a:defRPr sz="1280"/>
+            <a:lvl6pPr marL="2514600" indent="0" algn="ctr">
+              <a:buNone/>
+              <a:defRPr sz="1760"/>
             </a:lvl6pPr>
-            <a:lvl7pPr marL="2194560" indent="0" algn="ctr">
-              <a:buNone/>
-              <a:defRPr sz="1280"/>
+            <a:lvl7pPr marL="3017520" indent="0" algn="ctr">
+              <a:buNone/>
+              <a:defRPr sz="1760"/>
             </a:lvl7pPr>
-            <a:lvl8pPr marL="2560320" indent="0" algn="ctr">
-              <a:buNone/>
-              <a:defRPr sz="1280"/>
+            <a:lvl8pPr marL="3520440" indent="0" algn="ctr">
+              <a:buNone/>
+              <a:defRPr sz="1760"/>
             </a:lvl8pPr>
-            <a:lvl9pPr marL="2926080" indent="0" algn="ctr">
-              <a:buNone/>
-              <a:defRPr sz="1280"/>
+            <a:lvl9pPr marL="4023360" indent="0" algn="ctr">
+              <a:buNone/>
+              <a:defRPr sz="1760"/>
             </a:lvl9pPr>
           </a:lstStyle>
           <a:p>
@@ -255,7 +255,7 @@
           <a:p>
             <a:fld id="{797085E7-40F9-A64E-8856-170C486A5FE0}" type="datetimeFigureOut">
               <a:rPr lang="en-US" smtClean="0"/>
-              <a:t>4/10/18</a:t>
+              <a:t>4/12/18</a:t>
             </a:fld>
             <a:endParaRPr lang="en-US"/>
           </a:p>
@@ -306,7 +306,7 @@
     </p:spTree>
     <p:extLst>
       <p:ext uri="{BB962C8B-B14F-4D97-AF65-F5344CB8AC3E}">
-        <p14:creationId xmlns:p14="http://schemas.microsoft.com/office/powerpoint/2010/main" val="1713624294"/>
+        <p14:creationId xmlns:p14="http://schemas.microsoft.com/office/powerpoint/2010/main" val="3649786720"/>
       </p:ext>
     </p:extLst>
   </p:cSld>
@@ -425,7 +425,7 @@
           <a:p>
             <a:fld id="{797085E7-40F9-A64E-8856-170C486A5FE0}" type="datetimeFigureOut">
               <a:rPr lang="en-US" smtClean="0"/>
-              <a:t>4/10/18</a:t>
+              <a:t>4/12/18</a:t>
             </a:fld>
             <a:endParaRPr lang="en-US"/>
           </a:p>
@@ -476,7 +476,7 @@
     </p:spTree>
     <p:extLst>
       <p:ext uri="{BB962C8B-B14F-4D97-AF65-F5344CB8AC3E}">
-        <p14:creationId xmlns:p14="http://schemas.microsoft.com/office/powerpoint/2010/main" val="3367634707"/>
+        <p14:creationId xmlns:p14="http://schemas.microsoft.com/office/powerpoint/2010/main" val="3975664268"/>
       </p:ext>
     </p:extLst>
   </p:cSld>
@@ -515,8 +515,8 @@
         </p:nvSpPr>
         <p:spPr>
           <a:xfrm>
-            <a:off x="5234940" y="389467"/>
-            <a:ext cx="1577340" cy="6199294"/>
+            <a:off x="7198043" y="535517"/>
+            <a:ext cx="2168843" cy="8524029"/>
           </a:xfrm>
         </p:spPr>
         <p:txBody>
@@ -543,8 +543,8 @@
         </p:nvSpPr>
         <p:spPr>
           <a:xfrm>
-            <a:off x="502920" y="389467"/>
-            <a:ext cx="4640580" cy="6199294"/>
+            <a:off x="691515" y="535517"/>
+            <a:ext cx="6380798" cy="8524029"/>
           </a:xfrm>
         </p:spPr>
         <p:txBody>
@@ -605,7 +605,7 @@
           <a:p>
             <a:fld id="{797085E7-40F9-A64E-8856-170C486A5FE0}" type="datetimeFigureOut">
               <a:rPr lang="en-US" smtClean="0"/>
-              <a:t>4/10/18</a:t>
+              <a:t>4/12/18</a:t>
             </a:fld>
             <a:endParaRPr lang="en-US"/>
           </a:p>
@@ -656,7 +656,7 @@
     </p:spTree>
     <p:extLst>
       <p:ext uri="{BB962C8B-B14F-4D97-AF65-F5344CB8AC3E}">
-        <p14:creationId xmlns:p14="http://schemas.microsoft.com/office/powerpoint/2010/main" val="1528376957"/>
+        <p14:creationId xmlns:p14="http://schemas.microsoft.com/office/powerpoint/2010/main" val="2414016875"/>
       </p:ext>
     </p:extLst>
   </p:cSld>
@@ -775,7 +775,7 @@
           <a:p>
             <a:fld id="{797085E7-40F9-A64E-8856-170C486A5FE0}" type="datetimeFigureOut">
               <a:rPr lang="en-US" smtClean="0"/>
-              <a:t>4/10/18</a:t>
+              <a:t>4/12/18</a:t>
             </a:fld>
             <a:endParaRPr lang="en-US"/>
           </a:p>
@@ -826,7 +826,7 @@
     </p:spTree>
     <p:extLst>
       <p:ext uri="{BB962C8B-B14F-4D97-AF65-F5344CB8AC3E}">
-        <p14:creationId xmlns:p14="http://schemas.microsoft.com/office/powerpoint/2010/main" val="1185977031"/>
+        <p14:creationId xmlns:p14="http://schemas.microsoft.com/office/powerpoint/2010/main" val="3568729549"/>
       </p:ext>
     </p:extLst>
   </p:cSld>
@@ -865,15 +865,15 @@
         </p:nvSpPr>
         <p:spPr>
           <a:xfrm>
-            <a:off x="499110" y="1823722"/>
-            <a:ext cx="6309360" cy="3042919"/>
+            <a:off x="686277" y="2507618"/>
+            <a:ext cx="8675370" cy="4184014"/>
           </a:xfrm>
         </p:spPr>
         <p:txBody>
           <a:bodyPr anchor="b"/>
           <a:lstStyle>
             <a:lvl1pPr>
-              <a:defRPr sz="4800"/>
+              <a:defRPr sz="6600"/>
             </a:lvl1pPr>
           </a:lstStyle>
           <a:p>
@@ -897,8 +897,8 @@
         </p:nvSpPr>
         <p:spPr>
           <a:xfrm>
-            <a:off x="499110" y="4895429"/>
-            <a:ext cx="6309360" cy="1600199"/>
+            <a:off x="686277" y="6731215"/>
+            <a:ext cx="8675370" cy="2200274"/>
           </a:xfrm>
         </p:spPr>
         <p:txBody>
@@ -906,15 +906,15 @@
           <a:lstStyle>
             <a:lvl1pPr marL="0" indent="0">
               <a:buNone/>
-              <a:defRPr sz="1920">
+              <a:defRPr sz="2640">
                 <a:solidFill>
                   <a:schemeClr val="tx1"/>
                 </a:solidFill>
               </a:defRPr>
             </a:lvl1pPr>
-            <a:lvl2pPr marL="365760" indent="0">
-              <a:buNone/>
-              <a:defRPr sz="1600">
+            <a:lvl2pPr marL="502920" indent="0">
+              <a:buNone/>
+              <a:defRPr sz="2200">
                 <a:solidFill>
                   <a:schemeClr val="tx1">
                     <a:tint val="75000"/>
@@ -922,9 +922,9 @@
                 </a:solidFill>
               </a:defRPr>
             </a:lvl2pPr>
-            <a:lvl3pPr marL="731520" indent="0">
-              <a:buNone/>
-              <a:defRPr sz="1440">
+            <a:lvl3pPr marL="1005840" indent="0">
+              <a:buNone/>
+              <a:defRPr sz="1980">
                 <a:solidFill>
                   <a:schemeClr val="tx1">
                     <a:tint val="75000"/>
@@ -932,9 +932,9 @@
                 </a:solidFill>
               </a:defRPr>
             </a:lvl3pPr>
-            <a:lvl4pPr marL="1097280" indent="0">
-              <a:buNone/>
-              <a:defRPr sz="1280">
+            <a:lvl4pPr marL="1508760" indent="0">
+              <a:buNone/>
+              <a:defRPr sz="1760">
                 <a:solidFill>
                   <a:schemeClr val="tx1">
                     <a:tint val="75000"/>
@@ -942,9 +942,9 @@
                 </a:solidFill>
               </a:defRPr>
             </a:lvl4pPr>
-            <a:lvl5pPr marL="1463040" indent="0">
-              <a:buNone/>
-              <a:defRPr sz="1280">
+            <a:lvl5pPr marL="2011680" indent="0">
+              <a:buNone/>
+              <a:defRPr sz="1760">
                 <a:solidFill>
                   <a:schemeClr val="tx1">
                     <a:tint val="75000"/>
@@ -952,9 +952,9 @@
                 </a:solidFill>
               </a:defRPr>
             </a:lvl5pPr>
-            <a:lvl6pPr marL="1828800" indent="0">
-              <a:buNone/>
-              <a:defRPr sz="1280">
+            <a:lvl6pPr marL="2514600" indent="0">
+              <a:buNone/>
+              <a:defRPr sz="1760">
                 <a:solidFill>
                   <a:schemeClr val="tx1">
                     <a:tint val="75000"/>
@@ -962,9 +962,9 @@
                 </a:solidFill>
               </a:defRPr>
             </a:lvl6pPr>
-            <a:lvl7pPr marL="2194560" indent="0">
-              <a:buNone/>
-              <a:defRPr sz="1280">
+            <a:lvl7pPr marL="3017520" indent="0">
+              <a:buNone/>
+              <a:defRPr sz="1760">
                 <a:solidFill>
                   <a:schemeClr val="tx1">
                     <a:tint val="75000"/>
@@ -972,9 +972,9 @@
                 </a:solidFill>
               </a:defRPr>
             </a:lvl7pPr>
-            <a:lvl8pPr marL="2560320" indent="0">
-              <a:buNone/>
-              <a:defRPr sz="1280">
+            <a:lvl8pPr marL="3520440" indent="0">
+              <a:buNone/>
+              <a:defRPr sz="1760">
                 <a:solidFill>
                   <a:schemeClr val="tx1">
                     <a:tint val="75000"/>
@@ -982,9 +982,9 @@
                 </a:solidFill>
               </a:defRPr>
             </a:lvl8pPr>
-            <a:lvl9pPr marL="2926080" indent="0">
-              <a:buNone/>
-              <a:defRPr sz="1280">
+            <a:lvl9pPr marL="4023360" indent="0">
+              <a:buNone/>
+              <a:defRPr sz="1760">
                 <a:solidFill>
                   <a:schemeClr val="tx1">
                     <a:tint val="75000"/>
@@ -1019,7 +1019,7 @@
           <a:p>
             <a:fld id="{797085E7-40F9-A64E-8856-170C486A5FE0}" type="datetimeFigureOut">
               <a:rPr lang="en-US" smtClean="0"/>
-              <a:t>4/10/18</a:t>
+              <a:t>4/12/18</a:t>
             </a:fld>
             <a:endParaRPr lang="en-US"/>
           </a:p>
@@ -1070,7 +1070,7 @@
     </p:spTree>
     <p:extLst>
       <p:ext uri="{BB962C8B-B14F-4D97-AF65-F5344CB8AC3E}">
-        <p14:creationId xmlns:p14="http://schemas.microsoft.com/office/powerpoint/2010/main" val="335618377"/>
+        <p14:creationId xmlns:p14="http://schemas.microsoft.com/office/powerpoint/2010/main" val="4196571081"/>
       </p:ext>
     </p:extLst>
   </p:cSld>
@@ -1132,8 +1132,8 @@
         </p:nvSpPr>
         <p:spPr>
           <a:xfrm>
-            <a:off x="502920" y="1947333"/>
-            <a:ext cx="3108960" cy="4641427"/>
+            <a:off x="691515" y="2677584"/>
+            <a:ext cx="4274820" cy="6381962"/>
           </a:xfrm>
         </p:spPr>
         <p:txBody>
@@ -1189,8 +1189,8 @@
         </p:nvSpPr>
         <p:spPr>
           <a:xfrm>
-            <a:off x="3703320" y="1947333"/>
-            <a:ext cx="3108960" cy="4641427"/>
+            <a:off x="5092065" y="2677584"/>
+            <a:ext cx="4274820" cy="6381962"/>
           </a:xfrm>
         </p:spPr>
         <p:txBody>
@@ -1251,7 +1251,7 @@
           <a:p>
             <a:fld id="{797085E7-40F9-A64E-8856-170C486A5FE0}" type="datetimeFigureOut">
               <a:rPr lang="en-US" smtClean="0"/>
-              <a:t>4/10/18</a:t>
+              <a:t>4/12/18</a:t>
             </a:fld>
             <a:endParaRPr lang="en-US"/>
           </a:p>
@@ -1302,7 +1302,7 @@
     </p:spTree>
     <p:extLst>
       <p:ext uri="{BB962C8B-B14F-4D97-AF65-F5344CB8AC3E}">
-        <p14:creationId xmlns:p14="http://schemas.microsoft.com/office/powerpoint/2010/main" val="1613732668"/>
+        <p14:creationId xmlns:p14="http://schemas.microsoft.com/office/powerpoint/2010/main" val="4114446580"/>
       </p:ext>
     </p:extLst>
   </p:cSld>
@@ -1341,8 +1341,8 @@
         </p:nvSpPr>
         <p:spPr>
           <a:xfrm>
-            <a:off x="503873" y="389468"/>
-            <a:ext cx="6309360" cy="1413934"/>
+            <a:off x="692825" y="535519"/>
+            <a:ext cx="8675370" cy="1944159"/>
           </a:xfrm>
         </p:spPr>
         <p:txBody>
@@ -1369,8 +1369,8 @@
         </p:nvSpPr>
         <p:spPr>
           <a:xfrm>
-            <a:off x="503874" y="1793241"/>
-            <a:ext cx="3094672" cy="878839"/>
+            <a:off x="692826" y="2465706"/>
+            <a:ext cx="4255174" cy="1208404"/>
           </a:xfrm>
         </p:spPr>
         <p:txBody>
@@ -1378,39 +1378,39 @@
           <a:lstStyle>
             <a:lvl1pPr marL="0" indent="0">
               <a:buNone/>
-              <a:defRPr sz="1920" b="1"/>
+              <a:defRPr sz="2640" b="1"/>
             </a:lvl1pPr>
-            <a:lvl2pPr marL="365760" indent="0">
-              <a:buNone/>
-              <a:defRPr sz="1600" b="1"/>
+            <a:lvl2pPr marL="502920" indent="0">
+              <a:buNone/>
+              <a:defRPr sz="2200" b="1"/>
             </a:lvl2pPr>
-            <a:lvl3pPr marL="731520" indent="0">
-              <a:buNone/>
-              <a:defRPr sz="1440" b="1"/>
+            <a:lvl3pPr marL="1005840" indent="0">
+              <a:buNone/>
+              <a:defRPr sz="1980" b="1"/>
             </a:lvl3pPr>
-            <a:lvl4pPr marL="1097280" indent="0">
-              <a:buNone/>
-              <a:defRPr sz="1280" b="1"/>
+            <a:lvl4pPr marL="1508760" indent="0">
+              <a:buNone/>
+              <a:defRPr sz="1760" b="1"/>
             </a:lvl4pPr>
-            <a:lvl5pPr marL="1463040" indent="0">
-              <a:buNone/>
-              <a:defRPr sz="1280" b="1"/>
+            <a:lvl5pPr marL="2011680" indent="0">
+              <a:buNone/>
+              <a:defRPr sz="1760" b="1"/>
             </a:lvl5pPr>
-            <a:lvl6pPr marL="1828800" indent="0">
-              <a:buNone/>
-              <a:defRPr sz="1280" b="1"/>
+            <a:lvl6pPr marL="2514600" indent="0">
+              <a:buNone/>
+              <a:defRPr sz="1760" b="1"/>
             </a:lvl6pPr>
-            <a:lvl7pPr marL="2194560" indent="0">
-              <a:buNone/>
-              <a:defRPr sz="1280" b="1"/>
+            <a:lvl7pPr marL="3017520" indent="0">
+              <a:buNone/>
+              <a:defRPr sz="1760" b="1"/>
             </a:lvl7pPr>
-            <a:lvl8pPr marL="2560320" indent="0">
-              <a:buNone/>
-              <a:defRPr sz="1280" b="1"/>
+            <a:lvl8pPr marL="3520440" indent="0">
+              <a:buNone/>
+              <a:defRPr sz="1760" b="1"/>
             </a:lvl8pPr>
-            <a:lvl9pPr marL="2926080" indent="0">
-              <a:buNone/>
-              <a:defRPr sz="1280" b="1"/>
+            <a:lvl9pPr marL="4023360" indent="0">
+              <a:buNone/>
+              <a:defRPr sz="1760" b="1"/>
             </a:lvl9pPr>
           </a:lstStyle>
           <a:p>
@@ -1434,8 +1434,8 @@
         </p:nvSpPr>
         <p:spPr>
           <a:xfrm>
-            <a:off x="503874" y="2672080"/>
-            <a:ext cx="3094672" cy="3930227"/>
+            <a:off x="692826" y="3674110"/>
+            <a:ext cx="4255174" cy="5404062"/>
           </a:xfrm>
         </p:spPr>
         <p:txBody>
@@ -1491,8 +1491,8 @@
         </p:nvSpPr>
         <p:spPr>
           <a:xfrm>
-            <a:off x="3703320" y="1793241"/>
-            <a:ext cx="3109913" cy="878839"/>
+            <a:off x="5092066" y="2465706"/>
+            <a:ext cx="4276130" cy="1208404"/>
           </a:xfrm>
         </p:spPr>
         <p:txBody>
@@ -1500,39 +1500,39 @@
           <a:lstStyle>
             <a:lvl1pPr marL="0" indent="0">
               <a:buNone/>
-              <a:defRPr sz="1920" b="1"/>
+              <a:defRPr sz="2640" b="1"/>
             </a:lvl1pPr>
-            <a:lvl2pPr marL="365760" indent="0">
-              <a:buNone/>
-              <a:defRPr sz="1600" b="1"/>
+            <a:lvl2pPr marL="502920" indent="0">
+              <a:buNone/>
+              <a:defRPr sz="2200" b="1"/>
             </a:lvl2pPr>
-            <a:lvl3pPr marL="731520" indent="0">
-              <a:buNone/>
-              <a:defRPr sz="1440" b="1"/>
+            <a:lvl3pPr marL="1005840" indent="0">
+              <a:buNone/>
+              <a:defRPr sz="1980" b="1"/>
             </a:lvl3pPr>
-            <a:lvl4pPr marL="1097280" indent="0">
-              <a:buNone/>
-              <a:defRPr sz="1280" b="1"/>
+            <a:lvl4pPr marL="1508760" indent="0">
+              <a:buNone/>
+              <a:defRPr sz="1760" b="1"/>
             </a:lvl4pPr>
-            <a:lvl5pPr marL="1463040" indent="0">
-              <a:buNone/>
-              <a:defRPr sz="1280" b="1"/>
+            <a:lvl5pPr marL="2011680" indent="0">
+              <a:buNone/>
+              <a:defRPr sz="1760" b="1"/>
             </a:lvl5pPr>
-            <a:lvl6pPr marL="1828800" indent="0">
-              <a:buNone/>
-              <a:defRPr sz="1280" b="1"/>
+            <a:lvl6pPr marL="2514600" indent="0">
+              <a:buNone/>
+              <a:defRPr sz="1760" b="1"/>
             </a:lvl6pPr>
-            <a:lvl7pPr marL="2194560" indent="0">
-              <a:buNone/>
-              <a:defRPr sz="1280" b="1"/>
+            <a:lvl7pPr marL="3017520" indent="0">
+              <a:buNone/>
+              <a:defRPr sz="1760" b="1"/>
             </a:lvl7pPr>
-            <a:lvl8pPr marL="2560320" indent="0">
-              <a:buNone/>
-              <a:defRPr sz="1280" b="1"/>
+            <a:lvl8pPr marL="3520440" indent="0">
+              <a:buNone/>
+              <a:defRPr sz="1760" b="1"/>
             </a:lvl8pPr>
-            <a:lvl9pPr marL="2926080" indent="0">
-              <a:buNone/>
-              <a:defRPr sz="1280" b="1"/>
+            <a:lvl9pPr marL="4023360" indent="0">
+              <a:buNone/>
+              <a:defRPr sz="1760" b="1"/>
             </a:lvl9pPr>
           </a:lstStyle>
           <a:p>
@@ -1556,8 +1556,8 @@
         </p:nvSpPr>
         <p:spPr>
           <a:xfrm>
-            <a:off x="3703320" y="2672080"/>
-            <a:ext cx="3109913" cy="3930227"/>
+            <a:off x="5092066" y="3674110"/>
+            <a:ext cx="4276130" cy="5404062"/>
           </a:xfrm>
         </p:spPr>
         <p:txBody>
@@ -1618,7 +1618,7 @@
           <a:p>
             <a:fld id="{797085E7-40F9-A64E-8856-170C486A5FE0}" type="datetimeFigureOut">
               <a:rPr lang="en-US" smtClean="0"/>
-              <a:t>4/10/18</a:t>
+              <a:t>4/12/18</a:t>
             </a:fld>
             <a:endParaRPr lang="en-US"/>
           </a:p>
@@ -1669,7 +1669,7 @@
     </p:spTree>
     <p:extLst>
       <p:ext uri="{BB962C8B-B14F-4D97-AF65-F5344CB8AC3E}">
-        <p14:creationId xmlns:p14="http://schemas.microsoft.com/office/powerpoint/2010/main" val="4056370360"/>
+        <p14:creationId xmlns:p14="http://schemas.microsoft.com/office/powerpoint/2010/main" val="1639125278"/>
       </p:ext>
     </p:extLst>
   </p:cSld>
@@ -1736,7 +1736,7 @@
           <a:p>
             <a:fld id="{797085E7-40F9-A64E-8856-170C486A5FE0}" type="datetimeFigureOut">
               <a:rPr lang="en-US" smtClean="0"/>
-              <a:t>4/10/18</a:t>
+              <a:t>4/12/18</a:t>
             </a:fld>
             <a:endParaRPr lang="en-US"/>
           </a:p>
@@ -1787,7 +1787,7 @@
     </p:spTree>
     <p:extLst>
       <p:ext uri="{BB962C8B-B14F-4D97-AF65-F5344CB8AC3E}">
-        <p14:creationId xmlns:p14="http://schemas.microsoft.com/office/powerpoint/2010/main" val="552314715"/>
+        <p14:creationId xmlns:p14="http://schemas.microsoft.com/office/powerpoint/2010/main" val="1568761321"/>
       </p:ext>
     </p:extLst>
   </p:cSld>
@@ -1831,7 +1831,7 @@
           <a:p>
             <a:fld id="{797085E7-40F9-A64E-8856-170C486A5FE0}" type="datetimeFigureOut">
               <a:rPr lang="en-US" smtClean="0"/>
-              <a:t>4/10/18</a:t>
+              <a:t>4/12/18</a:t>
             </a:fld>
             <a:endParaRPr lang="en-US"/>
           </a:p>
@@ -1882,7 +1882,7 @@
     </p:spTree>
     <p:extLst>
       <p:ext uri="{BB962C8B-B14F-4D97-AF65-F5344CB8AC3E}">
-        <p14:creationId xmlns:p14="http://schemas.microsoft.com/office/powerpoint/2010/main" val="843085054"/>
+        <p14:creationId xmlns:p14="http://schemas.microsoft.com/office/powerpoint/2010/main" val="3112034243"/>
       </p:ext>
     </p:extLst>
   </p:cSld>
@@ -1921,15 +1921,15 @@
         </p:nvSpPr>
         <p:spPr>
           <a:xfrm>
-            <a:off x="503873" y="487680"/>
-            <a:ext cx="2359342" cy="1706880"/>
+            <a:off x="692825" y="670560"/>
+            <a:ext cx="3244096" cy="2346960"/>
           </a:xfrm>
         </p:spPr>
         <p:txBody>
           <a:bodyPr anchor="b"/>
           <a:lstStyle>
             <a:lvl1pPr>
-              <a:defRPr sz="2560"/>
+              <a:defRPr sz="3520"/>
             </a:lvl1pPr>
           </a:lstStyle>
           <a:p>
@@ -1953,39 +1953,39 @@
         </p:nvSpPr>
         <p:spPr>
           <a:xfrm>
-            <a:off x="3109913" y="1053255"/>
-            <a:ext cx="3703320" cy="5198533"/>
+            <a:off x="4276130" y="1448226"/>
+            <a:ext cx="5092065" cy="7147983"/>
           </a:xfrm>
         </p:spPr>
         <p:txBody>
           <a:bodyPr/>
           <a:lstStyle>
             <a:lvl1pPr>
-              <a:defRPr sz="2560"/>
+              <a:defRPr sz="3520"/>
             </a:lvl1pPr>
             <a:lvl2pPr>
-              <a:defRPr sz="2240"/>
+              <a:defRPr sz="3080"/>
             </a:lvl2pPr>
             <a:lvl3pPr>
-              <a:defRPr sz="1920"/>
+              <a:defRPr sz="2640"/>
             </a:lvl3pPr>
             <a:lvl4pPr>
-              <a:defRPr sz="1600"/>
+              <a:defRPr sz="2200"/>
             </a:lvl4pPr>
             <a:lvl5pPr>
-              <a:defRPr sz="1600"/>
+              <a:defRPr sz="2200"/>
             </a:lvl5pPr>
             <a:lvl6pPr>
-              <a:defRPr sz="1600"/>
+              <a:defRPr sz="2200"/>
             </a:lvl6pPr>
             <a:lvl7pPr>
-              <a:defRPr sz="1600"/>
+              <a:defRPr sz="2200"/>
             </a:lvl7pPr>
             <a:lvl8pPr>
-              <a:defRPr sz="1600"/>
+              <a:defRPr sz="2200"/>
             </a:lvl8pPr>
             <a:lvl9pPr>
-              <a:defRPr sz="1600"/>
+              <a:defRPr sz="2200"/>
             </a:lvl9pPr>
           </a:lstStyle>
           <a:p>
@@ -2038,8 +2038,8 @@
         </p:nvSpPr>
         <p:spPr>
           <a:xfrm>
-            <a:off x="503873" y="2194560"/>
-            <a:ext cx="2359342" cy="4065694"/>
+            <a:off x="692825" y="3017520"/>
+            <a:ext cx="3244096" cy="5590329"/>
           </a:xfrm>
         </p:spPr>
         <p:txBody>
@@ -2047,39 +2047,39 @@
           <a:lstStyle>
             <a:lvl1pPr marL="0" indent="0">
               <a:buNone/>
-              <a:defRPr sz="1280"/>
+              <a:defRPr sz="1760"/>
             </a:lvl1pPr>
-            <a:lvl2pPr marL="365760" indent="0">
-              <a:buNone/>
-              <a:defRPr sz="1120"/>
+            <a:lvl2pPr marL="502920" indent="0">
+              <a:buNone/>
+              <a:defRPr sz="1540"/>
             </a:lvl2pPr>
-            <a:lvl3pPr marL="731520" indent="0">
-              <a:buNone/>
-              <a:defRPr sz="960"/>
+            <a:lvl3pPr marL="1005840" indent="0">
+              <a:buNone/>
+              <a:defRPr sz="1320"/>
             </a:lvl3pPr>
-            <a:lvl4pPr marL="1097280" indent="0">
-              <a:buNone/>
-              <a:defRPr sz="800"/>
+            <a:lvl4pPr marL="1508760" indent="0">
+              <a:buNone/>
+              <a:defRPr sz="1100"/>
             </a:lvl4pPr>
-            <a:lvl5pPr marL="1463040" indent="0">
-              <a:buNone/>
-              <a:defRPr sz="800"/>
+            <a:lvl5pPr marL="2011680" indent="0">
+              <a:buNone/>
+              <a:defRPr sz="1100"/>
             </a:lvl5pPr>
-            <a:lvl6pPr marL="1828800" indent="0">
-              <a:buNone/>
-              <a:defRPr sz="800"/>
+            <a:lvl6pPr marL="2514600" indent="0">
+              <a:buNone/>
+              <a:defRPr sz="1100"/>
             </a:lvl6pPr>
-            <a:lvl7pPr marL="2194560" indent="0">
-              <a:buNone/>
-              <a:defRPr sz="800"/>
+            <a:lvl7pPr marL="3017520" indent="0">
+              <a:buNone/>
+              <a:defRPr sz="1100"/>
             </a:lvl7pPr>
-            <a:lvl8pPr marL="2560320" indent="0">
-              <a:buNone/>
-              <a:defRPr sz="800"/>
+            <a:lvl8pPr marL="3520440" indent="0">
+              <a:buNone/>
+              <a:defRPr sz="1100"/>
             </a:lvl8pPr>
-            <a:lvl9pPr marL="2926080" indent="0">
-              <a:buNone/>
-              <a:defRPr sz="800"/>
+            <a:lvl9pPr marL="4023360" indent="0">
+              <a:buNone/>
+              <a:defRPr sz="1100"/>
             </a:lvl9pPr>
           </a:lstStyle>
           <a:p>
@@ -2108,7 +2108,7 @@
           <a:p>
             <a:fld id="{797085E7-40F9-A64E-8856-170C486A5FE0}" type="datetimeFigureOut">
               <a:rPr lang="en-US" smtClean="0"/>
-              <a:t>4/10/18</a:t>
+              <a:t>4/12/18</a:t>
             </a:fld>
             <a:endParaRPr lang="en-US"/>
           </a:p>
@@ -2159,7 +2159,7 @@
     </p:spTree>
     <p:extLst>
       <p:ext uri="{BB962C8B-B14F-4D97-AF65-F5344CB8AC3E}">
-        <p14:creationId xmlns:p14="http://schemas.microsoft.com/office/powerpoint/2010/main" val="3466468037"/>
+        <p14:creationId xmlns:p14="http://schemas.microsoft.com/office/powerpoint/2010/main" val="3829898144"/>
       </p:ext>
     </p:extLst>
   </p:cSld>
@@ -2198,15 +2198,15 @@
         </p:nvSpPr>
         <p:spPr>
           <a:xfrm>
-            <a:off x="503873" y="487680"/>
-            <a:ext cx="2359342" cy="1706880"/>
+            <a:off x="692825" y="670560"/>
+            <a:ext cx="3244096" cy="2346960"/>
           </a:xfrm>
         </p:spPr>
         <p:txBody>
           <a:bodyPr anchor="b"/>
           <a:lstStyle>
             <a:lvl1pPr>
-              <a:defRPr sz="2560"/>
+              <a:defRPr sz="3520"/>
             </a:lvl1pPr>
           </a:lstStyle>
           <a:p>
@@ -2230,8 +2230,8 @@
         </p:nvSpPr>
         <p:spPr>
           <a:xfrm>
-            <a:off x="3109913" y="1053255"/>
-            <a:ext cx="3703320" cy="5198533"/>
+            <a:off x="4276130" y="1448226"/>
+            <a:ext cx="5092065" cy="7147983"/>
           </a:xfrm>
         </p:spPr>
         <p:txBody>
@@ -2239,39 +2239,39 @@
           <a:lstStyle>
             <a:lvl1pPr marL="0" indent="0">
               <a:buNone/>
-              <a:defRPr sz="2560"/>
+              <a:defRPr sz="3520"/>
             </a:lvl1pPr>
-            <a:lvl2pPr marL="365760" indent="0">
-              <a:buNone/>
-              <a:defRPr sz="2240"/>
+            <a:lvl2pPr marL="502920" indent="0">
+              <a:buNone/>
+              <a:defRPr sz="3080"/>
             </a:lvl2pPr>
-            <a:lvl3pPr marL="731520" indent="0">
-              <a:buNone/>
-              <a:defRPr sz="1920"/>
+            <a:lvl3pPr marL="1005840" indent="0">
+              <a:buNone/>
+              <a:defRPr sz="2640"/>
             </a:lvl3pPr>
-            <a:lvl4pPr marL="1097280" indent="0">
-              <a:buNone/>
-              <a:defRPr sz="1600"/>
+            <a:lvl4pPr marL="1508760" indent="0">
+              <a:buNone/>
+              <a:defRPr sz="2200"/>
             </a:lvl4pPr>
-            <a:lvl5pPr marL="1463040" indent="0">
-              <a:buNone/>
-              <a:defRPr sz="1600"/>
+            <a:lvl5pPr marL="2011680" indent="0">
+              <a:buNone/>
+              <a:defRPr sz="2200"/>
             </a:lvl5pPr>
-            <a:lvl6pPr marL="1828800" indent="0">
-              <a:buNone/>
-              <a:defRPr sz="1600"/>
+            <a:lvl6pPr marL="2514600" indent="0">
+              <a:buNone/>
+              <a:defRPr sz="2200"/>
             </a:lvl6pPr>
-            <a:lvl7pPr marL="2194560" indent="0">
-              <a:buNone/>
-              <a:defRPr sz="1600"/>
+            <a:lvl7pPr marL="3017520" indent="0">
+              <a:buNone/>
+              <a:defRPr sz="2200"/>
             </a:lvl7pPr>
-            <a:lvl8pPr marL="2560320" indent="0">
-              <a:buNone/>
-              <a:defRPr sz="1600"/>
+            <a:lvl8pPr marL="3520440" indent="0">
+              <a:buNone/>
+              <a:defRPr sz="2200"/>
             </a:lvl8pPr>
-            <a:lvl9pPr marL="2926080" indent="0">
-              <a:buNone/>
-              <a:defRPr sz="1600"/>
+            <a:lvl9pPr marL="4023360" indent="0">
+              <a:buNone/>
+              <a:defRPr sz="2200"/>
             </a:lvl9pPr>
           </a:lstStyle>
           <a:p>
@@ -2295,8 +2295,8 @@
         </p:nvSpPr>
         <p:spPr>
           <a:xfrm>
-            <a:off x="503873" y="2194560"/>
-            <a:ext cx="2359342" cy="4065694"/>
+            <a:off x="692825" y="3017520"/>
+            <a:ext cx="3244096" cy="5590329"/>
           </a:xfrm>
         </p:spPr>
         <p:txBody>
@@ -2304,39 +2304,39 @@
           <a:lstStyle>
             <a:lvl1pPr marL="0" indent="0">
               <a:buNone/>
-              <a:defRPr sz="1280"/>
+              <a:defRPr sz="1760"/>
             </a:lvl1pPr>
-            <a:lvl2pPr marL="365760" indent="0">
-              <a:buNone/>
-              <a:defRPr sz="1120"/>
+            <a:lvl2pPr marL="502920" indent="0">
+              <a:buNone/>
+              <a:defRPr sz="1540"/>
             </a:lvl2pPr>
-            <a:lvl3pPr marL="731520" indent="0">
-              <a:buNone/>
-              <a:defRPr sz="960"/>
+            <a:lvl3pPr marL="1005840" indent="0">
+              <a:buNone/>
+              <a:defRPr sz="1320"/>
             </a:lvl3pPr>
-            <a:lvl4pPr marL="1097280" indent="0">
-              <a:buNone/>
-              <a:defRPr sz="800"/>
+            <a:lvl4pPr marL="1508760" indent="0">
+              <a:buNone/>
+              <a:defRPr sz="1100"/>
             </a:lvl4pPr>
-            <a:lvl5pPr marL="1463040" indent="0">
-              <a:buNone/>
-              <a:defRPr sz="800"/>
+            <a:lvl5pPr marL="2011680" indent="0">
+              <a:buNone/>
+              <a:defRPr sz="1100"/>
             </a:lvl5pPr>
-            <a:lvl6pPr marL="1828800" indent="0">
-              <a:buNone/>
-              <a:defRPr sz="800"/>
+            <a:lvl6pPr marL="2514600" indent="0">
+              <a:buNone/>
+              <a:defRPr sz="1100"/>
             </a:lvl6pPr>
-            <a:lvl7pPr marL="2194560" indent="0">
-              <a:buNone/>
-              <a:defRPr sz="800"/>
+            <a:lvl7pPr marL="3017520" indent="0">
+              <a:buNone/>
+              <a:defRPr sz="1100"/>
             </a:lvl7pPr>
-            <a:lvl8pPr marL="2560320" indent="0">
-              <a:buNone/>
-              <a:defRPr sz="800"/>
+            <a:lvl8pPr marL="3520440" indent="0">
+              <a:buNone/>
+              <a:defRPr sz="1100"/>
             </a:lvl8pPr>
-            <a:lvl9pPr marL="2926080" indent="0">
-              <a:buNone/>
-              <a:defRPr sz="800"/>
+            <a:lvl9pPr marL="4023360" indent="0">
+              <a:buNone/>
+              <a:defRPr sz="1100"/>
             </a:lvl9pPr>
           </a:lstStyle>
           <a:p>
@@ -2365,7 +2365,7 @@
           <a:p>
             <a:fld id="{797085E7-40F9-A64E-8856-170C486A5FE0}" type="datetimeFigureOut">
               <a:rPr lang="en-US" smtClean="0"/>
-              <a:t>4/10/18</a:t>
+              <a:t>4/12/18</a:t>
             </a:fld>
             <a:endParaRPr lang="en-US"/>
           </a:p>
@@ -2416,7 +2416,7 @@
     </p:spTree>
     <p:extLst>
       <p:ext uri="{BB962C8B-B14F-4D97-AF65-F5344CB8AC3E}">
-        <p14:creationId xmlns:p14="http://schemas.microsoft.com/office/powerpoint/2010/main" val="4195362790"/>
+        <p14:creationId xmlns:p14="http://schemas.microsoft.com/office/powerpoint/2010/main" val="628956497"/>
       </p:ext>
     </p:extLst>
   </p:cSld>
@@ -2460,8 +2460,8 @@
         </p:nvSpPr>
         <p:spPr>
           <a:xfrm>
-            <a:off x="502920" y="389468"/>
-            <a:ext cx="6309360" cy="1413934"/>
+            <a:off x="691515" y="535519"/>
+            <a:ext cx="8675370" cy="1944159"/>
           </a:xfrm>
           <a:prstGeom prst="rect">
             <a:avLst/>
@@ -2493,8 +2493,8 @@
         </p:nvSpPr>
         <p:spPr>
           <a:xfrm>
-            <a:off x="502920" y="1947333"/>
-            <a:ext cx="6309360" cy="4641427"/>
+            <a:off x="691515" y="2677584"/>
+            <a:ext cx="8675370" cy="6381962"/>
           </a:xfrm>
           <a:prstGeom prst="rect">
             <a:avLst/>
@@ -2555,8 +2555,8 @@
         </p:nvSpPr>
         <p:spPr>
           <a:xfrm>
-            <a:off x="502920" y="6780108"/>
-            <a:ext cx="1645920" cy="389467"/>
+            <a:off x="691515" y="9322649"/>
+            <a:ext cx="2263140" cy="535517"/>
           </a:xfrm>
           <a:prstGeom prst="rect">
             <a:avLst/>
@@ -2566,7 +2566,7 @@
           <a:bodyPr vert="horz" lIns="91440" tIns="45720" rIns="91440" bIns="45720" rtlCol="0" anchor="ctr"/>
           <a:lstStyle>
             <a:lvl1pPr algn="l">
-              <a:defRPr sz="960">
+              <a:defRPr sz="1320">
                 <a:solidFill>
                   <a:schemeClr val="tx1">
                     <a:tint val="75000"/>
@@ -2578,7 +2578,7 @@
           <a:p>
             <a:fld id="{797085E7-40F9-A64E-8856-170C486A5FE0}" type="datetimeFigureOut">
               <a:rPr lang="en-US" smtClean="0"/>
-              <a:t>4/10/18</a:t>
+              <a:t>4/12/18</a:t>
             </a:fld>
             <a:endParaRPr lang="en-US"/>
           </a:p>
@@ -2596,8 +2596,8 @@
         </p:nvSpPr>
         <p:spPr>
           <a:xfrm>
-            <a:off x="2423160" y="6780108"/>
-            <a:ext cx="2468880" cy="389467"/>
+            <a:off x="3331845" y="9322649"/>
+            <a:ext cx="3394710" cy="535517"/>
           </a:xfrm>
           <a:prstGeom prst="rect">
             <a:avLst/>
@@ -2607,7 +2607,7 @@
           <a:bodyPr vert="horz" lIns="91440" tIns="45720" rIns="91440" bIns="45720" rtlCol="0" anchor="ctr"/>
           <a:lstStyle>
             <a:lvl1pPr algn="ctr">
-              <a:defRPr sz="960">
+              <a:defRPr sz="1320">
                 <a:solidFill>
                   <a:schemeClr val="tx1">
                     <a:tint val="75000"/>
@@ -2633,8 +2633,8 @@
         </p:nvSpPr>
         <p:spPr>
           <a:xfrm>
-            <a:off x="5166360" y="6780108"/>
-            <a:ext cx="1645920" cy="389467"/>
+            <a:off x="7103745" y="9322649"/>
+            <a:ext cx="2263140" cy="535517"/>
           </a:xfrm>
           <a:prstGeom prst="rect">
             <a:avLst/>
@@ -2644,7 +2644,7 @@
           <a:bodyPr vert="horz" lIns="91440" tIns="45720" rIns="91440" bIns="45720" rtlCol="0" anchor="ctr"/>
           <a:lstStyle>
             <a:lvl1pPr algn="r">
-              <a:defRPr sz="960">
+              <a:defRPr sz="1320">
                 <a:solidFill>
                   <a:schemeClr val="tx1">
                     <a:tint val="75000"/>
@@ -2665,27 +2665,27 @@
     </p:spTree>
     <p:extLst>
       <p:ext uri="{BB962C8B-B14F-4D97-AF65-F5344CB8AC3E}">
-        <p14:creationId xmlns:p14="http://schemas.microsoft.com/office/powerpoint/2010/main" val="1713077285"/>
+        <p14:creationId xmlns:p14="http://schemas.microsoft.com/office/powerpoint/2010/main" val="3196781142"/>
       </p:ext>
     </p:extLst>
   </p:cSld>
   <p:clrMap bg1="lt1" tx1="dk1" bg2="lt2" tx2="dk2" accent1="accent1" accent2="accent2" accent3="accent3" accent4="accent4" accent5="accent5" accent6="accent6" hlink="hlink" folHlink="folHlink"/>
   <p:sldLayoutIdLst>
-    <p:sldLayoutId id="2147483697" r:id="rId1"/>
-    <p:sldLayoutId id="2147483698" r:id="rId2"/>
-    <p:sldLayoutId id="2147483699" r:id="rId3"/>
-    <p:sldLayoutId id="2147483700" r:id="rId4"/>
-    <p:sldLayoutId id="2147483701" r:id="rId5"/>
-    <p:sldLayoutId id="2147483702" r:id="rId6"/>
-    <p:sldLayoutId id="2147483703" r:id="rId7"/>
-    <p:sldLayoutId id="2147483704" r:id="rId8"/>
-    <p:sldLayoutId id="2147483705" r:id="rId9"/>
-    <p:sldLayoutId id="2147483706" r:id="rId10"/>
-    <p:sldLayoutId id="2147483707" r:id="rId11"/>
+    <p:sldLayoutId id="2147483829" r:id="rId1"/>
+    <p:sldLayoutId id="2147483830" r:id="rId2"/>
+    <p:sldLayoutId id="2147483831" r:id="rId3"/>
+    <p:sldLayoutId id="2147483832" r:id="rId4"/>
+    <p:sldLayoutId id="2147483833" r:id="rId5"/>
+    <p:sldLayoutId id="2147483834" r:id="rId6"/>
+    <p:sldLayoutId id="2147483835" r:id="rId7"/>
+    <p:sldLayoutId id="2147483836" r:id="rId8"/>
+    <p:sldLayoutId id="2147483837" r:id="rId9"/>
+    <p:sldLayoutId id="2147483838" r:id="rId10"/>
+    <p:sldLayoutId id="2147483839" r:id="rId11"/>
   </p:sldLayoutIdLst>
   <p:txStyles>
     <p:titleStyle>
-      <a:lvl1pPr algn="l" defTabSz="731520" rtl="0" eaLnBrk="1" latinLnBrk="0" hangingPunct="1">
+      <a:lvl1pPr algn="l" defTabSz="1005840" rtl="0" eaLnBrk="1" latinLnBrk="0" hangingPunct="1">
         <a:lnSpc>
           <a:spcPct val="90000"/>
         </a:lnSpc>
@@ -2693,7 +2693,7 @@
           <a:spcPct val="0"/>
         </a:spcBef>
         <a:buNone/>
-        <a:defRPr sz="3520" kern="1200">
+        <a:defRPr sz="4840" kern="1200">
           <a:solidFill>
             <a:schemeClr val="tx1"/>
           </a:solidFill>
@@ -2704,16 +2704,16 @@
       </a:lvl1pPr>
     </p:titleStyle>
     <p:bodyStyle>
-      <a:lvl1pPr marL="182880" indent="-182880" algn="l" defTabSz="731520" rtl="0" eaLnBrk="1" latinLnBrk="0" hangingPunct="1">
+      <a:lvl1pPr marL="251460" indent="-251460" algn="l" defTabSz="1005840" rtl="0" eaLnBrk="1" latinLnBrk="0" hangingPunct="1">
         <a:lnSpc>
           <a:spcPct val="90000"/>
         </a:lnSpc>
         <a:spcBef>
-          <a:spcPts val="800"/>
+          <a:spcPts val="1100"/>
         </a:spcBef>
         <a:buFont typeface="Arial" panose="020B0604020202020204" pitchFamily="34" charset="0"/>
         <a:buChar char="•"/>
-        <a:defRPr sz="2240" kern="1200">
+        <a:defRPr sz="3080" kern="1200">
           <a:solidFill>
             <a:schemeClr val="tx1"/>
           </a:solidFill>
@@ -2722,16 +2722,16 @@
           <a:cs typeface="+mn-cs"/>
         </a:defRPr>
       </a:lvl1pPr>
-      <a:lvl2pPr marL="548640" indent="-182880" algn="l" defTabSz="731520" rtl="0" eaLnBrk="1" latinLnBrk="0" hangingPunct="1">
+      <a:lvl2pPr marL="754380" indent="-251460" algn="l" defTabSz="1005840" rtl="0" eaLnBrk="1" latinLnBrk="0" hangingPunct="1">
         <a:lnSpc>
           <a:spcPct val="90000"/>
         </a:lnSpc>
         <a:spcBef>
-          <a:spcPts val="400"/>
+          <a:spcPts val="550"/>
         </a:spcBef>
         <a:buFont typeface="Arial" panose="020B0604020202020204" pitchFamily="34" charset="0"/>
         <a:buChar char="•"/>
-        <a:defRPr sz="1920" kern="1200">
+        <a:defRPr sz="2640" kern="1200">
           <a:solidFill>
             <a:schemeClr val="tx1"/>
           </a:solidFill>
@@ -2740,16 +2740,16 @@
           <a:cs typeface="+mn-cs"/>
         </a:defRPr>
       </a:lvl2pPr>
-      <a:lvl3pPr marL="914400" indent="-182880" algn="l" defTabSz="731520" rtl="0" eaLnBrk="1" latinLnBrk="0" hangingPunct="1">
+      <a:lvl3pPr marL="1257300" indent="-251460" algn="l" defTabSz="1005840" rtl="0" eaLnBrk="1" latinLnBrk="0" hangingPunct="1">
         <a:lnSpc>
           <a:spcPct val="90000"/>
         </a:lnSpc>
         <a:spcBef>
-          <a:spcPts val="400"/>
+          <a:spcPts val="550"/>
         </a:spcBef>
         <a:buFont typeface="Arial" panose="020B0604020202020204" pitchFamily="34" charset="0"/>
         <a:buChar char="•"/>
-        <a:defRPr sz="1600" kern="1200">
+        <a:defRPr sz="2200" kern="1200">
           <a:solidFill>
             <a:schemeClr val="tx1"/>
           </a:solidFill>
@@ -2758,16 +2758,16 @@
           <a:cs typeface="+mn-cs"/>
         </a:defRPr>
       </a:lvl3pPr>
-      <a:lvl4pPr marL="1280160" indent="-182880" algn="l" defTabSz="731520" rtl="0" eaLnBrk="1" latinLnBrk="0" hangingPunct="1">
+      <a:lvl4pPr marL="1760220" indent="-251460" algn="l" defTabSz="1005840" rtl="0" eaLnBrk="1" latinLnBrk="0" hangingPunct="1">
         <a:lnSpc>
           <a:spcPct val="90000"/>
         </a:lnSpc>
         <a:spcBef>
-          <a:spcPts val="400"/>
+          <a:spcPts val="550"/>
         </a:spcBef>
         <a:buFont typeface="Arial" panose="020B0604020202020204" pitchFamily="34" charset="0"/>
         <a:buChar char="•"/>
-        <a:defRPr sz="1440" kern="1200">
+        <a:defRPr sz="1980" kern="1200">
           <a:solidFill>
             <a:schemeClr val="tx1"/>
           </a:solidFill>
@@ -2776,16 +2776,16 @@
           <a:cs typeface="+mn-cs"/>
         </a:defRPr>
       </a:lvl4pPr>
-      <a:lvl5pPr marL="1645920" indent="-182880" algn="l" defTabSz="731520" rtl="0" eaLnBrk="1" latinLnBrk="0" hangingPunct="1">
+      <a:lvl5pPr marL="2263140" indent="-251460" algn="l" defTabSz="1005840" rtl="0" eaLnBrk="1" latinLnBrk="0" hangingPunct="1">
         <a:lnSpc>
           <a:spcPct val="90000"/>
         </a:lnSpc>
         <a:spcBef>
-          <a:spcPts val="400"/>
+          <a:spcPts val="550"/>
         </a:spcBef>
         <a:buFont typeface="Arial" panose="020B0604020202020204" pitchFamily="34" charset="0"/>
         <a:buChar char="•"/>
-        <a:defRPr sz="1440" kern="1200">
+        <a:defRPr sz="1980" kern="1200">
           <a:solidFill>
             <a:schemeClr val="tx1"/>
           </a:solidFill>
@@ -2794,16 +2794,16 @@
           <a:cs typeface="+mn-cs"/>
         </a:defRPr>
       </a:lvl5pPr>
-      <a:lvl6pPr marL="2011680" indent="-182880" algn="l" defTabSz="731520" rtl="0" eaLnBrk="1" latinLnBrk="0" hangingPunct="1">
+      <a:lvl6pPr marL="2766060" indent="-251460" algn="l" defTabSz="1005840" rtl="0" eaLnBrk="1" latinLnBrk="0" hangingPunct="1">
         <a:lnSpc>
           <a:spcPct val="90000"/>
         </a:lnSpc>
         <a:spcBef>
-          <a:spcPts val="400"/>
+          <a:spcPts val="550"/>
         </a:spcBef>
         <a:buFont typeface="Arial" panose="020B0604020202020204" pitchFamily="34" charset="0"/>
         <a:buChar char="•"/>
-        <a:defRPr sz="1440" kern="1200">
+        <a:defRPr sz="1980" kern="1200">
           <a:solidFill>
             <a:schemeClr val="tx1"/>
           </a:solidFill>
@@ -2812,16 +2812,16 @@
           <a:cs typeface="+mn-cs"/>
         </a:defRPr>
       </a:lvl6pPr>
-      <a:lvl7pPr marL="2377440" indent="-182880" algn="l" defTabSz="731520" rtl="0" eaLnBrk="1" latinLnBrk="0" hangingPunct="1">
+      <a:lvl7pPr marL="3268980" indent="-251460" algn="l" defTabSz="1005840" rtl="0" eaLnBrk="1" latinLnBrk="0" hangingPunct="1">
         <a:lnSpc>
           <a:spcPct val="90000"/>
         </a:lnSpc>
         <a:spcBef>
-          <a:spcPts val="400"/>
+          <a:spcPts val="550"/>
         </a:spcBef>
         <a:buFont typeface="Arial" panose="020B0604020202020204" pitchFamily="34" charset="0"/>
         <a:buChar char="•"/>
-        <a:defRPr sz="1440" kern="1200">
+        <a:defRPr sz="1980" kern="1200">
           <a:solidFill>
             <a:schemeClr val="tx1"/>
           </a:solidFill>
@@ -2830,16 +2830,16 @@
           <a:cs typeface="+mn-cs"/>
         </a:defRPr>
       </a:lvl7pPr>
-      <a:lvl8pPr marL="2743200" indent="-182880" algn="l" defTabSz="731520" rtl="0" eaLnBrk="1" latinLnBrk="0" hangingPunct="1">
+      <a:lvl8pPr marL="3771900" indent="-251460" algn="l" defTabSz="1005840" rtl="0" eaLnBrk="1" latinLnBrk="0" hangingPunct="1">
         <a:lnSpc>
           <a:spcPct val="90000"/>
         </a:lnSpc>
         <a:spcBef>
-          <a:spcPts val="400"/>
+          <a:spcPts val="550"/>
         </a:spcBef>
         <a:buFont typeface="Arial" panose="020B0604020202020204" pitchFamily="34" charset="0"/>
         <a:buChar char="•"/>
-        <a:defRPr sz="1440" kern="1200">
+        <a:defRPr sz="1980" kern="1200">
           <a:solidFill>
             <a:schemeClr val="tx1"/>
           </a:solidFill>
@@ -2848,16 +2848,16 @@
           <a:cs typeface="+mn-cs"/>
         </a:defRPr>
       </a:lvl8pPr>
-      <a:lvl9pPr marL="3108960" indent="-182880" algn="l" defTabSz="731520" rtl="0" eaLnBrk="1" latinLnBrk="0" hangingPunct="1">
+      <a:lvl9pPr marL="4274820" indent="-251460" algn="l" defTabSz="1005840" rtl="0" eaLnBrk="1" latinLnBrk="0" hangingPunct="1">
         <a:lnSpc>
           <a:spcPct val="90000"/>
         </a:lnSpc>
         <a:spcBef>
-          <a:spcPts val="400"/>
+          <a:spcPts val="550"/>
         </a:spcBef>
         <a:buFont typeface="Arial" panose="020B0604020202020204" pitchFamily="34" charset="0"/>
         <a:buChar char="•"/>
-        <a:defRPr sz="1440" kern="1200">
+        <a:defRPr sz="1980" kern="1200">
           <a:solidFill>
             <a:schemeClr val="tx1"/>
           </a:solidFill>
@@ -2871,8 +2871,8 @@
       <a:defPPr>
         <a:defRPr lang="en-US"/>
       </a:defPPr>
-      <a:lvl1pPr marL="0" algn="l" defTabSz="731520" rtl="0" eaLnBrk="1" latinLnBrk="0" hangingPunct="1">
-        <a:defRPr sz="1440" kern="1200">
+      <a:lvl1pPr marL="0" algn="l" defTabSz="1005840" rtl="0" eaLnBrk="1" latinLnBrk="0" hangingPunct="1">
+        <a:defRPr sz="1980" kern="1200">
           <a:solidFill>
             <a:schemeClr val="tx1"/>
           </a:solidFill>
@@ -2881,8 +2881,8 @@
           <a:cs typeface="+mn-cs"/>
         </a:defRPr>
       </a:lvl1pPr>
-      <a:lvl2pPr marL="365760" algn="l" defTabSz="731520" rtl="0" eaLnBrk="1" latinLnBrk="0" hangingPunct="1">
-        <a:defRPr sz="1440" kern="1200">
+      <a:lvl2pPr marL="502920" algn="l" defTabSz="1005840" rtl="0" eaLnBrk="1" latinLnBrk="0" hangingPunct="1">
+        <a:defRPr sz="1980" kern="1200">
           <a:solidFill>
             <a:schemeClr val="tx1"/>
           </a:solidFill>
@@ -2891,8 +2891,8 @@
           <a:cs typeface="+mn-cs"/>
         </a:defRPr>
       </a:lvl2pPr>
-      <a:lvl3pPr marL="731520" algn="l" defTabSz="731520" rtl="0" eaLnBrk="1" latinLnBrk="0" hangingPunct="1">
-        <a:defRPr sz="1440" kern="1200">
+      <a:lvl3pPr marL="1005840" algn="l" defTabSz="1005840" rtl="0" eaLnBrk="1" latinLnBrk="0" hangingPunct="1">
+        <a:defRPr sz="1980" kern="1200">
           <a:solidFill>
             <a:schemeClr val="tx1"/>
           </a:solidFill>
@@ -2901,8 +2901,8 @@
           <a:cs typeface="+mn-cs"/>
         </a:defRPr>
       </a:lvl3pPr>
-      <a:lvl4pPr marL="1097280" algn="l" defTabSz="731520" rtl="0" eaLnBrk="1" latinLnBrk="0" hangingPunct="1">
-        <a:defRPr sz="1440" kern="1200">
+      <a:lvl4pPr marL="1508760" algn="l" defTabSz="1005840" rtl="0" eaLnBrk="1" latinLnBrk="0" hangingPunct="1">
+        <a:defRPr sz="1980" kern="1200">
           <a:solidFill>
             <a:schemeClr val="tx1"/>
           </a:solidFill>
@@ -2911,8 +2911,8 @@
           <a:cs typeface="+mn-cs"/>
         </a:defRPr>
       </a:lvl4pPr>
-      <a:lvl5pPr marL="1463040" algn="l" defTabSz="731520" rtl="0" eaLnBrk="1" latinLnBrk="0" hangingPunct="1">
-        <a:defRPr sz="1440" kern="1200">
+      <a:lvl5pPr marL="2011680" algn="l" defTabSz="1005840" rtl="0" eaLnBrk="1" latinLnBrk="0" hangingPunct="1">
+        <a:defRPr sz="1980" kern="1200">
           <a:solidFill>
             <a:schemeClr val="tx1"/>
           </a:solidFill>
@@ -2921,8 +2921,8 @@
           <a:cs typeface="+mn-cs"/>
         </a:defRPr>
       </a:lvl5pPr>
-      <a:lvl6pPr marL="1828800" algn="l" defTabSz="731520" rtl="0" eaLnBrk="1" latinLnBrk="0" hangingPunct="1">
-        <a:defRPr sz="1440" kern="1200">
+      <a:lvl6pPr marL="2514600" algn="l" defTabSz="1005840" rtl="0" eaLnBrk="1" latinLnBrk="0" hangingPunct="1">
+        <a:defRPr sz="1980" kern="1200">
           <a:solidFill>
             <a:schemeClr val="tx1"/>
           </a:solidFill>
@@ -2931,8 +2931,8 @@
           <a:cs typeface="+mn-cs"/>
         </a:defRPr>
       </a:lvl6pPr>
-      <a:lvl7pPr marL="2194560" algn="l" defTabSz="731520" rtl="0" eaLnBrk="1" latinLnBrk="0" hangingPunct="1">
-        <a:defRPr sz="1440" kern="1200">
+      <a:lvl7pPr marL="3017520" algn="l" defTabSz="1005840" rtl="0" eaLnBrk="1" latinLnBrk="0" hangingPunct="1">
+        <a:defRPr sz="1980" kern="1200">
           <a:solidFill>
             <a:schemeClr val="tx1"/>
           </a:solidFill>
@@ -2941,8 +2941,8 @@
           <a:cs typeface="+mn-cs"/>
         </a:defRPr>
       </a:lvl7pPr>
-      <a:lvl8pPr marL="2560320" algn="l" defTabSz="731520" rtl="0" eaLnBrk="1" latinLnBrk="0" hangingPunct="1">
-        <a:defRPr sz="1440" kern="1200">
+      <a:lvl8pPr marL="3520440" algn="l" defTabSz="1005840" rtl="0" eaLnBrk="1" latinLnBrk="0" hangingPunct="1">
+        <a:defRPr sz="1980" kern="1200">
           <a:solidFill>
             <a:schemeClr val="tx1"/>
           </a:solidFill>
@@ -2951,8 +2951,8 @@
           <a:cs typeface="+mn-cs"/>
         </a:defRPr>
       </a:lvl8pPr>
-      <a:lvl9pPr marL="2926080" algn="l" defTabSz="731520" rtl="0" eaLnBrk="1" latinLnBrk="0" hangingPunct="1">
-        <a:defRPr sz="1440" kern="1200">
+      <a:lvl9pPr marL="4023360" algn="l" defTabSz="1005840" rtl="0" eaLnBrk="1" latinLnBrk="0" hangingPunct="1">
+        <a:defRPr sz="1980" kern="1200">
           <a:solidFill>
             <a:schemeClr val="tx1"/>
           </a:solidFill>
@@ -2983,6 +2983,743 @@
           <a:chExt cx="0" cy="0"/>
         </a:xfrm>
       </p:grpSpPr>
+      <p:pic>
+        <p:nvPicPr>
+          <p:cNvPr id="33" name="Picture 32">
+            <a:extLst>
+              <a:ext uri="{FF2B5EF4-FFF2-40B4-BE49-F238E27FC236}">
+                <a16:creationId xmlns:a16="http://schemas.microsoft.com/office/drawing/2014/main" id="{349CA479-082E-3244-ACEE-2B76CFB81A32}"/>
+              </a:ext>
+            </a:extLst>
+          </p:cNvPr>
+          <p:cNvPicPr>
+            <a:picLocks noChangeAspect="1"/>
+          </p:cNvPicPr>
+          <p:nvPr/>
+        </p:nvPicPr>
+        <p:blipFill>
+          <a:blip r:embed="rId2"/>
+          <a:stretch>
+            <a:fillRect/>
+          </a:stretch>
+        </p:blipFill>
+        <p:spPr>
+          <a:xfrm>
+            <a:off x="889000" y="279400"/>
+            <a:ext cx="8280400" cy="9499600"/>
+          </a:xfrm>
+          <a:prstGeom prst="rect">
+            <a:avLst/>
+          </a:prstGeom>
+        </p:spPr>
+      </p:pic>
+      <p:sp>
+        <p:nvSpPr>
+          <p:cNvPr id="35" name="Oval 34">
+            <a:extLst>
+              <a:ext uri="{FF2B5EF4-FFF2-40B4-BE49-F238E27FC236}">
+                <a16:creationId xmlns:a16="http://schemas.microsoft.com/office/drawing/2014/main" id="{C88F07E3-36E4-A143-BEC2-A54775F9AEAF}"/>
+              </a:ext>
+            </a:extLst>
+          </p:cNvPr>
+          <p:cNvSpPr/>
+          <p:nvPr/>
+        </p:nvSpPr>
+        <p:spPr>
+          <a:xfrm>
+            <a:off x="4101690" y="930332"/>
+            <a:ext cx="257132" cy="249097"/>
+          </a:xfrm>
+          <a:prstGeom prst="ellipse">
+            <a:avLst/>
+          </a:prstGeom>
+          <a:solidFill>
+            <a:schemeClr val="accent1">
+              <a:lumMod val="60000"/>
+              <a:lumOff val="40000"/>
+              <a:alpha val="39608"/>
+            </a:schemeClr>
+          </a:solidFill>
+          <a:ln>
+            <a:solidFill>
+              <a:schemeClr val="accent1">
+                <a:lumMod val="60000"/>
+                <a:lumOff val="40000"/>
+              </a:schemeClr>
+            </a:solidFill>
+          </a:ln>
+        </p:spPr>
+        <p:style>
+          <a:lnRef idx="2">
+            <a:schemeClr val="accent1">
+              <a:shade val="50000"/>
+            </a:schemeClr>
+          </a:lnRef>
+          <a:fillRef idx="1">
+            <a:schemeClr val="accent1"/>
+          </a:fillRef>
+          <a:effectRef idx="0">
+            <a:schemeClr val="accent1"/>
+          </a:effectRef>
+          <a:fontRef idx="minor">
+            <a:schemeClr val="lt1"/>
+          </a:fontRef>
+        </p:style>
+        <p:txBody>
+          <a:bodyPr rtlCol="0" anchor="ctr"/>
+          <a:lstStyle/>
+          <a:p>
+            <a:pPr algn="ctr"/>
+            <a:endParaRPr lang="en-US" sz="1661" dirty="0"/>
+          </a:p>
+        </p:txBody>
+      </p:sp>
+      <p:sp>
+        <p:nvSpPr>
+          <p:cNvPr id="36" name="Oval 35">
+            <a:extLst>
+              <a:ext uri="{FF2B5EF4-FFF2-40B4-BE49-F238E27FC236}">
+                <a16:creationId xmlns:a16="http://schemas.microsoft.com/office/drawing/2014/main" id="{C2CE14F5-4D4E-434F-85C7-64DD3E7A1015}"/>
+              </a:ext>
+            </a:extLst>
+          </p:cNvPr>
+          <p:cNvSpPr/>
+          <p:nvPr/>
+        </p:nvSpPr>
+        <p:spPr>
+          <a:xfrm>
+            <a:off x="1783151" y="2076851"/>
+            <a:ext cx="257132" cy="249097"/>
+          </a:xfrm>
+          <a:prstGeom prst="ellipse">
+            <a:avLst/>
+          </a:prstGeom>
+          <a:solidFill>
+            <a:schemeClr val="accent4">
+              <a:lumMod val="60000"/>
+              <a:lumOff val="40000"/>
+              <a:alpha val="39608"/>
+            </a:schemeClr>
+          </a:solidFill>
+          <a:ln>
+            <a:solidFill>
+              <a:schemeClr val="accent4">
+                <a:lumMod val="60000"/>
+                <a:lumOff val="40000"/>
+              </a:schemeClr>
+            </a:solidFill>
+          </a:ln>
+        </p:spPr>
+        <p:style>
+          <a:lnRef idx="2">
+            <a:schemeClr val="accent1">
+              <a:shade val="50000"/>
+            </a:schemeClr>
+          </a:lnRef>
+          <a:fillRef idx="1">
+            <a:schemeClr val="accent1"/>
+          </a:fillRef>
+          <a:effectRef idx="0">
+            <a:schemeClr val="accent1"/>
+          </a:effectRef>
+          <a:fontRef idx="minor">
+            <a:schemeClr val="lt1"/>
+          </a:fontRef>
+        </p:style>
+        <p:txBody>
+          <a:bodyPr rtlCol="0" anchor="ctr"/>
+          <a:lstStyle/>
+          <a:p>
+            <a:pPr algn="ctr"/>
+            <a:endParaRPr lang="en-US" sz="1661"/>
+          </a:p>
+        </p:txBody>
+      </p:sp>
+      <p:sp>
+        <p:nvSpPr>
+          <p:cNvPr id="37" name="Oval 36">
+            <a:extLst>
+              <a:ext uri="{FF2B5EF4-FFF2-40B4-BE49-F238E27FC236}">
+                <a16:creationId xmlns:a16="http://schemas.microsoft.com/office/drawing/2014/main" id="{7D43247D-EED6-9145-8504-AF44F8AD844A}"/>
+              </a:ext>
+            </a:extLst>
+          </p:cNvPr>
+          <p:cNvSpPr/>
+          <p:nvPr/>
+        </p:nvSpPr>
+        <p:spPr>
+          <a:xfrm>
+            <a:off x="6731697" y="8684586"/>
+            <a:ext cx="292477" cy="249097"/>
+          </a:xfrm>
+          <a:prstGeom prst="ellipse">
+            <a:avLst/>
+          </a:prstGeom>
+          <a:solidFill>
+            <a:schemeClr val="accent6">
+              <a:lumMod val="50000"/>
+              <a:alpha val="39608"/>
+            </a:schemeClr>
+          </a:solidFill>
+          <a:ln>
+            <a:solidFill>
+              <a:schemeClr val="accent6">
+                <a:lumMod val="50000"/>
+              </a:schemeClr>
+            </a:solidFill>
+          </a:ln>
+        </p:spPr>
+        <p:style>
+          <a:lnRef idx="2">
+            <a:schemeClr val="accent1">
+              <a:shade val="50000"/>
+            </a:schemeClr>
+          </a:lnRef>
+          <a:fillRef idx="1">
+            <a:schemeClr val="accent1"/>
+          </a:fillRef>
+          <a:effectRef idx="0">
+            <a:schemeClr val="accent1"/>
+          </a:effectRef>
+          <a:fontRef idx="minor">
+            <a:schemeClr val="lt1"/>
+          </a:fontRef>
+        </p:style>
+        <p:txBody>
+          <a:bodyPr rtlCol="0" anchor="ctr"/>
+          <a:lstStyle/>
+          <a:p>
+            <a:pPr algn="ctr"/>
+            <a:endParaRPr lang="en-US" sz="1661"/>
+          </a:p>
+        </p:txBody>
+      </p:sp>
+      <p:sp>
+        <p:nvSpPr>
+          <p:cNvPr id="38" name="Oval 37">
+            <a:extLst>
+              <a:ext uri="{FF2B5EF4-FFF2-40B4-BE49-F238E27FC236}">
+                <a16:creationId xmlns:a16="http://schemas.microsoft.com/office/drawing/2014/main" id="{2F955E6F-A1B7-8D4F-8A6C-EE1FA1DDD361}"/>
+              </a:ext>
+            </a:extLst>
+          </p:cNvPr>
+          <p:cNvSpPr/>
+          <p:nvPr/>
+        </p:nvSpPr>
+        <p:spPr>
+          <a:xfrm>
+            <a:off x="8048772" y="6695412"/>
+            <a:ext cx="257132" cy="249097"/>
+          </a:xfrm>
+          <a:prstGeom prst="ellipse">
+            <a:avLst/>
+          </a:prstGeom>
+          <a:solidFill>
+            <a:schemeClr val="accent1">
+              <a:lumMod val="75000"/>
+              <a:alpha val="39608"/>
+            </a:schemeClr>
+          </a:solidFill>
+          <a:ln>
+            <a:solidFill>
+              <a:schemeClr val="accent1">
+                <a:lumMod val="75000"/>
+              </a:schemeClr>
+            </a:solidFill>
+          </a:ln>
+        </p:spPr>
+        <p:style>
+          <a:lnRef idx="2">
+            <a:schemeClr val="accent1">
+              <a:shade val="50000"/>
+            </a:schemeClr>
+          </a:lnRef>
+          <a:fillRef idx="1">
+            <a:schemeClr val="accent1"/>
+          </a:fillRef>
+          <a:effectRef idx="0">
+            <a:schemeClr val="accent1"/>
+          </a:effectRef>
+          <a:fontRef idx="minor">
+            <a:schemeClr val="lt1"/>
+          </a:fontRef>
+        </p:style>
+        <p:txBody>
+          <a:bodyPr rtlCol="0" anchor="ctr"/>
+          <a:lstStyle/>
+          <a:p>
+            <a:pPr algn="ctr"/>
+            <a:endParaRPr lang="en-US" sz="1661"/>
+          </a:p>
+        </p:txBody>
+      </p:sp>
+      <p:sp>
+        <p:nvSpPr>
+          <p:cNvPr id="39" name="Oval 38">
+            <a:extLst>
+              <a:ext uri="{FF2B5EF4-FFF2-40B4-BE49-F238E27FC236}">
+                <a16:creationId xmlns:a16="http://schemas.microsoft.com/office/drawing/2014/main" id="{5E02FEA5-EFDF-B442-9691-FC3F2B785A71}"/>
+              </a:ext>
+            </a:extLst>
+          </p:cNvPr>
+          <p:cNvSpPr/>
+          <p:nvPr/>
+        </p:nvSpPr>
+        <p:spPr>
+          <a:xfrm>
+            <a:off x="6390274" y="3457704"/>
+            <a:ext cx="257132" cy="249097"/>
+          </a:xfrm>
+          <a:prstGeom prst="ellipse">
+            <a:avLst/>
+          </a:prstGeom>
+          <a:solidFill>
+            <a:schemeClr val="accent2">
+              <a:lumMod val="75000"/>
+              <a:alpha val="39608"/>
+            </a:schemeClr>
+          </a:solidFill>
+          <a:ln>
+            <a:solidFill>
+              <a:schemeClr val="accent2">
+                <a:lumMod val="75000"/>
+              </a:schemeClr>
+            </a:solidFill>
+          </a:ln>
+        </p:spPr>
+        <p:style>
+          <a:lnRef idx="2">
+            <a:schemeClr val="accent1">
+              <a:shade val="50000"/>
+            </a:schemeClr>
+          </a:lnRef>
+          <a:fillRef idx="1">
+            <a:schemeClr val="accent1"/>
+          </a:fillRef>
+          <a:effectRef idx="0">
+            <a:schemeClr val="accent1"/>
+          </a:effectRef>
+          <a:fontRef idx="minor">
+            <a:schemeClr val="lt1"/>
+          </a:fontRef>
+        </p:style>
+        <p:txBody>
+          <a:bodyPr rtlCol="0" anchor="ctr"/>
+          <a:lstStyle/>
+          <a:p>
+            <a:pPr algn="ctr"/>
+            <a:endParaRPr lang="en-US" sz="1661"/>
+          </a:p>
+        </p:txBody>
+      </p:sp>
+      <p:sp>
+        <p:nvSpPr>
+          <p:cNvPr id="40" name="TextBox 39">
+            <a:extLst>
+              <a:ext uri="{FF2B5EF4-FFF2-40B4-BE49-F238E27FC236}">
+                <a16:creationId xmlns:a16="http://schemas.microsoft.com/office/drawing/2014/main" id="{3A470F77-F5E0-8B46-BCEF-01372EF93340}"/>
+              </a:ext>
+            </a:extLst>
+          </p:cNvPr>
+          <p:cNvSpPr txBox="1"/>
+          <p:nvPr/>
+        </p:nvSpPr>
+        <p:spPr>
+          <a:xfrm>
+            <a:off x="4358818" y="930333"/>
+            <a:ext cx="950771" cy="262829"/>
+          </a:xfrm>
+          <a:prstGeom prst="rect">
+            <a:avLst/>
+          </a:prstGeom>
+          <a:noFill/>
+        </p:spPr>
+        <p:txBody>
+          <a:bodyPr wrap="square" rtlCol="0">
+            <a:spAutoFit/>
+          </a:bodyPr>
+          <a:lstStyle/>
+          <a:p>
+            <a:r>
+              <a:rPr lang="en-US" sz="1108" b="1" dirty="0">
+                <a:latin typeface="Arial" panose="020B0604020202020204" pitchFamily="34" charset="0"/>
+                <a:cs typeface="Arial" panose="020B0604020202020204" pitchFamily="34" charset="0"/>
+              </a:rPr>
+              <a:t>ST8, ST239</a:t>
+            </a:r>
+          </a:p>
+        </p:txBody>
+      </p:sp>
+      <p:sp>
+        <p:nvSpPr>
+          <p:cNvPr id="41" name="TextBox 40">
+            <a:extLst>
+              <a:ext uri="{FF2B5EF4-FFF2-40B4-BE49-F238E27FC236}">
+                <a16:creationId xmlns:a16="http://schemas.microsoft.com/office/drawing/2014/main" id="{9FD871BD-6399-A740-9EB1-1105F84FFE54}"/>
+              </a:ext>
+            </a:extLst>
+          </p:cNvPr>
+          <p:cNvSpPr txBox="1"/>
+          <p:nvPr/>
+        </p:nvSpPr>
+        <p:spPr>
+          <a:xfrm>
+            <a:off x="927385" y="2076851"/>
+            <a:ext cx="946020" cy="262829"/>
+          </a:xfrm>
+          <a:prstGeom prst="rect">
+            <a:avLst/>
+          </a:prstGeom>
+          <a:noFill/>
+        </p:spPr>
+        <p:txBody>
+          <a:bodyPr wrap="square" rtlCol="0">
+            <a:spAutoFit/>
+          </a:bodyPr>
+          <a:lstStyle/>
+          <a:p>
+            <a:r>
+              <a:rPr lang="en-US" sz="1108" b="1" dirty="0">
+                <a:latin typeface="Arial" panose="020B0604020202020204" pitchFamily="34" charset="0"/>
+                <a:cs typeface="Arial" panose="020B0604020202020204" pitchFamily="34" charset="0"/>
+              </a:rPr>
+              <a:t>ST5, ST105</a:t>
+            </a:r>
+          </a:p>
+        </p:txBody>
+      </p:sp>
+      <p:sp>
+        <p:nvSpPr>
+          <p:cNvPr id="42" name="TextBox 41">
+            <a:extLst>
+              <a:ext uri="{FF2B5EF4-FFF2-40B4-BE49-F238E27FC236}">
+                <a16:creationId xmlns:a16="http://schemas.microsoft.com/office/drawing/2014/main" id="{60CD6055-F85F-7640-A9B1-4D10FD80383F}"/>
+              </a:ext>
+            </a:extLst>
+          </p:cNvPr>
+          <p:cNvSpPr txBox="1"/>
+          <p:nvPr/>
+        </p:nvSpPr>
+        <p:spPr>
+          <a:xfrm>
+            <a:off x="6627322" y="3454460"/>
+            <a:ext cx="674972" cy="262829"/>
+          </a:xfrm>
+          <a:prstGeom prst="rect">
+            <a:avLst/>
+          </a:prstGeom>
+          <a:noFill/>
+        </p:spPr>
+        <p:txBody>
+          <a:bodyPr wrap="square" rtlCol="0">
+            <a:spAutoFit/>
+          </a:bodyPr>
+          <a:lstStyle/>
+          <a:p>
+            <a:r>
+              <a:rPr lang="en-US" sz="1108" b="1" dirty="0">
+                <a:latin typeface="Arial" panose="020B0604020202020204" pitchFamily="34" charset="0"/>
+                <a:cs typeface="Arial" panose="020B0604020202020204" pitchFamily="34" charset="0"/>
+              </a:rPr>
+              <a:t>ST22</a:t>
+            </a:r>
+          </a:p>
+        </p:txBody>
+      </p:sp>
+      <p:sp>
+        <p:nvSpPr>
+          <p:cNvPr id="43" name="TextBox 42">
+            <a:extLst>
+              <a:ext uri="{FF2B5EF4-FFF2-40B4-BE49-F238E27FC236}">
+                <a16:creationId xmlns:a16="http://schemas.microsoft.com/office/drawing/2014/main" id="{F931D2C6-0E6E-4847-BF0E-270099B0E852}"/>
+              </a:ext>
+            </a:extLst>
+          </p:cNvPr>
+          <p:cNvSpPr txBox="1"/>
+          <p:nvPr/>
+        </p:nvSpPr>
+        <p:spPr>
+          <a:xfrm>
+            <a:off x="8305909" y="6688924"/>
+            <a:ext cx="674972" cy="262829"/>
+          </a:xfrm>
+          <a:prstGeom prst="rect">
+            <a:avLst/>
+          </a:prstGeom>
+          <a:noFill/>
+        </p:spPr>
+        <p:txBody>
+          <a:bodyPr wrap="square" rtlCol="0">
+            <a:spAutoFit/>
+          </a:bodyPr>
+          <a:lstStyle/>
+          <a:p>
+            <a:r>
+              <a:rPr lang="en-US" sz="1108" b="1" dirty="0">
+                <a:latin typeface="Arial" panose="020B0604020202020204" pitchFamily="34" charset="0"/>
+                <a:cs typeface="Arial" panose="020B0604020202020204" pitchFamily="34" charset="0"/>
+              </a:rPr>
+              <a:t>ST45</a:t>
+            </a:r>
+          </a:p>
+        </p:txBody>
+      </p:sp>
+      <p:sp>
+        <p:nvSpPr>
+          <p:cNvPr id="44" name="TextBox 43">
+            <a:extLst>
+              <a:ext uri="{FF2B5EF4-FFF2-40B4-BE49-F238E27FC236}">
+                <a16:creationId xmlns:a16="http://schemas.microsoft.com/office/drawing/2014/main" id="{DECDD5B1-EB05-8845-94B5-68B3E618D7A9}"/>
+              </a:ext>
+            </a:extLst>
+          </p:cNvPr>
+          <p:cNvSpPr txBox="1"/>
+          <p:nvPr/>
+        </p:nvSpPr>
+        <p:spPr>
+          <a:xfrm>
+            <a:off x="6988828" y="8678094"/>
+            <a:ext cx="1059944" cy="262829"/>
+          </a:xfrm>
+          <a:prstGeom prst="rect">
+            <a:avLst/>
+          </a:prstGeom>
+          <a:noFill/>
+        </p:spPr>
+        <p:txBody>
+          <a:bodyPr wrap="square" rtlCol="0">
+            <a:spAutoFit/>
+          </a:bodyPr>
+          <a:lstStyle/>
+          <a:p>
+            <a:r>
+              <a:rPr lang="en-US" sz="1108" b="1" dirty="0">
+                <a:latin typeface="Arial" panose="020B0604020202020204" pitchFamily="34" charset="0"/>
+                <a:cs typeface="Arial" panose="020B0604020202020204" pitchFamily="34" charset="0"/>
+              </a:rPr>
+              <a:t>ST30, ST36</a:t>
+            </a:r>
+          </a:p>
+        </p:txBody>
+      </p:sp>
+      <p:sp>
+        <p:nvSpPr>
+          <p:cNvPr id="45" name="Oval 44">
+            <a:extLst>
+              <a:ext uri="{FF2B5EF4-FFF2-40B4-BE49-F238E27FC236}">
+                <a16:creationId xmlns:a16="http://schemas.microsoft.com/office/drawing/2014/main" id="{C2855193-461C-364B-A521-B1B76686ED76}"/>
+              </a:ext>
+            </a:extLst>
+          </p:cNvPr>
+          <p:cNvSpPr/>
+          <p:nvPr/>
+        </p:nvSpPr>
+        <p:spPr>
+          <a:xfrm>
+            <a:off x="7571648" y="7905811"/>
+            <a:ext cx="257132" cy="249098"/>
+          </a:xfrm>
+          <a:prstGeom prst="ellipse">
+            <a:avLst/>
+          </a:prstGeom>
+          <a:solidFill>
+            <a:srgbClr val="FF0000">
+              <a:alpha val="39608"/>
+            </a:srgbClr>
+          </a:solidFill>
+          <a:ln>
+            <a:solidFill>
+              <a:srgbClr val="FF0000"/>
+            </a:solidFill>
+          </a:ln>
+        </p:spPr>
+        <p:style>
+          <a:lnRef idx="2">
+            <a:schemeClr val="accent1">
+              <a:shade val="50000"/>
+            </a:schemeClr>
+          </a:lnRef>
+          <a:fillRef idx="1">
+            <a:schemeClr val="accent1"/>
+          </a:fillRef>
+          <a:effectRef idx="0">
+            <a:schemeClr val="accent1"/>
+          </a:effectRef>
+          <a:fontRef idx="minor">
+            <a:schemeClr val="lt1"/>
+          </a:fontRef>
+        </p:style>
+        <p:txBody>
+          <a:bodyPr rtlCol="0" anchor="ctr"/>
+          <a:lstStyle/>
+          <a:p>
+            <a:pPr algn="ctr"/>
+            <a:endParaRPr lang="en-US" sz="1661"/>
+          </a:p>
+        </p:txBody>
+      </p:sp>
+      <p:sp>
+        <p:nvSpPr>
+          <p:cNvPr id="46" name="TextBox 45">
+            <a:extLst>
+              <a:ext uri="{FF2B5EF4-FFF2-40B4-BE49-F238E27FC236}">
+                <a16:creationId xmlns:a16="http://schemas.microsoft.com/office/drawing/2014/main" id="{6E85634A-13DA-2644-9437-3AFDB4C208E6}"/>
+              </a:ext>
+            </a:extLst>
+          </p:cNvPr>
+          <p:cNvSpPr txBox="1"/>
+          <p:nvPr/>
+        </p:nvSpPr>
+        <p:spPr>
+          <a:xfrm>
+            <a:off x="7828779" y="7899323"/>
+            <a:ext cx="674972" cy="262829"/>
+          </a:xfrm>
+          <a:prstGeom prst="rect">
+            <a:avLst/>
+          </a:prstGeom>
+          <a:noFill/>
+        </p:spPr>
+        <p:txBody>
+          <a:bodyPr wrap="square" rtlCol="0">
+            <a:spAutoFit/>
+          </a:bodyPr>
+          <a:lstStyle/>
+          <a:p>
+            <a:r>
+              <a:rPr lang="en-US" sz="1108" b="1" dirty="0">
+                <a:latin typeface="Arial" panose="020B0604020202020204" pitchFamily="34" charset="0"/>
+                <a:cs typeface="Arial" panose="020B0604020202020204" pitchFamily="34" charset="0"/>
+              </a:rPr>
+              <a:t>ST398</a:t>
+            </a:r>
+          </a:p>
+        </p:txBody>
+      </p:sp>
+      <p:sp>
+        <p:nvSpPr>
+          <p:cNvPr id="47" name="Oval 46">
+            <a:extLst>
+              <a:ext uri="{FF2B5EF4-FFF2-40B4-BE49-F238E27FC236}">
+                <a16:creationId xmlns:a16="http://schemas.microsoft.com/office/drawing/2014/main" id="{347AF077-A893-8D42-80EA-13BB92735ECC}"/>
+              </a:ext>
+            </a:extLst>
+          </p:cNvPr>
+          <p:cNvSpPr/>
+          <p:nvPr/>
+        </p:nvSpPr>
+        <p:spPr>
+          <a:xfrm>
+            <a:off x="3671803" y="731334"/>
+            <a:ext cx="257132" cy="249098"/>
+          </a:xfrm>
+          <a:prstGeom prst="ellipse">
+            <a:avLst/>
+          </a:prstGeom>
+          <a:solidFill>
+            <a:srgbClr val="A74E5D">
+              <a:alpha val="39608"/>
+            </a:srgbClr>
+          </a:solidFill>
+          <a:ln>
+            <a:solidFill>
+              <a:srgbClr val="A74E5D"/>
+            </a:solidFill>
+          </a:ln>
+        </p:spPr>
+        <p:style>
+          <a:lnRef idx="2">
+            <a:schemeClr val="accent1">
+              <a:shade val="50000"/>
+            </a:schemeClr>
+          </a:lnRef>
+          <a:fillRef idx="1">
+            <a:schemeClr val="accent1"/>
+          </a:fillRef>
+          <a:effectRef idx="0">
+            <a:schemeClr val="accent1"/>
+          </a:effectRef>
+          <a:fontRef idx="minor">
+            <a:schemeClr val="lt1"/>
+          </a:fontRef>
+        </p:style>
+        <p:txBody>
+          <a:bodyPr rtlCol="0" anchor="ctr"/>
+          <a:lstStyle/>
+          <a:p>
+            <a:pPr algn="ctr"/>
+            <a:endParaRPr lang="en-US" sz="1661"/>
+          </a:p>
+        </p:txBody>
+      </p:sp>
+      <p:sp>
+        <p:nvSpPr>
+          <p:cNvPr id="48" name="TextBox 47">
+            <a:extLst>
+              <a:ext uri="{FF2B5EF4-FFF2-40B4-BE49-F238E27FC236}">
+                <a16:creationId xmlns:a16="http://schemas.microsoft.com/office/drawing/2014/main" id="{404F965F-B72A-D64D-9537-CE6203C1DB71}"/>
+              </a:ext>
+            </a:extLst>
+          </p:cNvPr>
+          <p:cNvSpPr txBox="1"/>
+          <p:nvPr/>
+        </p:nvSpPr>
+        <p:spPr>
+          <a:xfrm>
+            <a:off x="3784297" y="566006"/>
+            <a:ext cx="674972" cy="262829"/>
+          </a:xfrm>
+          <a:prstGeom prst="rect">
+            <a:avLst/>
+          </a:prstGeom>
+          <a:noFill/>
+        </p:spPr>
+        <p:txBody>
+          <a:bodyPr wrap="square" rtlCol="0">
+            <a:spAutoFit/>
+          </a:bodyPr>
+          <a:lstStyle/>
+          <a:p>
+            <a:r>
+              <a:rPr lang="en-US" sz="1108" b="1" dirty="0">
+                <a:latin typeface="Arial" panose="020B0604020202020204" pitchFamily="34" charset="0"/>
+                <a:cs typeface="Arial" panose="020B0604020202020204" pitchFamily="34" charset="0"/>
+              </a:rPr>
+              <a:t>ST15</a:t>
+            </a:r>
+          </a:p>
+        </p:txBody>
+      </p:sp>
+    </p:spTree>
+    <p:extLst>
+      <p:ext uri="{BB962C8B-B14F-4D97-AF65-F5344CB8AC3E}">
+        <p14:creationId xmlns:p14="http://schemas.microsoft.com/office/powerpoint/2010/main" val="4222078623"/>
+      </p:ext>
+    </p:extLst>
+  </p:cSld>
+  <p:clrMapOvr>
+    <a:masterClrMapping/>
+  </p:clrMapOvr>
+</p:sld>
+</file>
+
+<file path=ppt/slides/slide2.xml><?xml version="1.0" encoding="utf-8"?>
+<p:sld xmlns:a="http://schemas.openxmlformats.org/drawingml/2006/main" xmlns:r="http://schemas.openxmlformats.org/officeDocument/2006/relationships" xmlns:p="http://schemas.openxmlformats.org/presentationml/2006/main">
+  <p:cSld>
+    <p:spTree>
+      <p:nvGrpSpPr>
+        <p:cNvPr id="1" name=""/>
+        <p:cNvGrpSpPr/>
+        <p:nvPr/>
+      </p:nvGrpSpPr>
+      <p:grpSpPr>
+        <a:xfrm>
+          <a:off x="0" y="0"/>
+          <a:ext cx="0" cy="0"/>
+          <a:chOff x="0" y="0"/>
+          <a:chExt cx="0" cy="0"/>
+        </a:xfrm>
+      </p:grpSpPr>
       <p:grpSp>
         <p:nvGrpSpPr>
           <p:cNvPr id="22" name="Group 21">
@@ -2997,8 +3734,8 @@
         </p:nvGrpSpPr>
         <p:grpSpPr>
           <a:xfrm>
-            <a:off x="130628" y="0"/>
-            <a:ext cx="7053943" cy="7315200"/>
+            <a:off x="1774875" y="1654344"/>
+            <a:ext cx="6508655" cy="6749717"/>
             <a:chOff x="130628" y="0"/>
             <a:chExt cx="7053943" cy="7315200"/>
           </a:xfrm>
@@ -3090,7 +3827,7 @@
             <a:lstStyle/>
             <a:p>
               <a:pPr algn="ctr"/>
-              <a:endParaRPr lang="en-US"/>
+              <a:endParaRPr lang="en-US" sz="1661"/>
             </a:p>
           </p:txBody>
         </p:sp>
@@ -3151,7 +3888,7 @@
             <a:lstStyle/>
             <a:p>
               <a:pPr algn="ctr"/>
-              <a:endParaRPr lang="en-US"/>
+              <a:endParaRPr lang="en-US" sz="1661"/>
             </a:p>
           </p:txBody>
         </p:sp>
@@ -3210,7 +3947,7 @@
             <a:lstStyle/>
             <a:p>
               <a:pPr algn="ctr"/>
-              <a:endParaRPr lang="en-US"/>
+              <a:endParaRPr lang="en-US" sz="1661"/>
             </a:p>
           </p:txBody>
         </p:sp>
@@ -3266,7 +4003,7 @@
             <a:lstStyle/>
             <a:p>
               <a:pPr algn="ctr"/>
-              <a:endParaRPr lang="en-US"/>
+              <a:endParaRPr lang="en-US" sz="1661"/>
             </a:p>
           </p:txBody>
         </p:sp>
@@ -3325,7 +4062,7 @@
             <a:lstStyle/>
             <a:p>
               <a:pPr algn="ctr"/>
-              <a:endParaRPr lang="en-US"/>
+              <a:endParaRPr lang="en-US" sz="1661"/>
             </a:p>
           </p:txBody>
         </p:sp>
@@ -3384,7 +4121,7 @@
             <a:lstStyle/>
             <a:p>
               <a:pPr algn="ctr"/>
-              <a:endParaRPr lang="en-US"/>
+              <a:endParaRPr lang="en-US" sz="1661"/>
             </a:p>
           </p:txBody>
         </p:sp>
@@ -3443,7 +4180,7 @@
             <a:lstStyle/>
             <a:p>
               <a:pPr algn="ctr"/>
-              <a:endParaRPr lang="en-US"/>
+              <a:endParaRPr lang="en-US" sz="1661"/>
             </a:p>
           </p:txBody>
         </p:sp>
@@ -3504,7 +4241,7 @@
             <a:lstStyle/>
             <a:p>
               <a:pPr algn="ctr"/>
-              <a:endParaRPr lang="en-US"/>
+              <a:endParaRPr lang="en-US" sz="1661"/>
             </a:p>
           </p:txBody>
         </p:sp>
@@ -3523,8 +4260,8 @@
         </p:nvSpPr>
         <p:spPr>
           <a:xfrm>
-            <a:off x="3100251" y="496389"/>
-            <a:ext cx="731520" cy="276999"/>
+            <a:off x="4514943" y="2112362"/>
+            <a:ext cx="674972" cy="262829"/>
           </a:xfrm>
           <a:prstGeom prst="rect">
             <a:avLst/>
@@ -3538,7 +4275,7 @@
           <a:lstStyle/>
           <a:p>
             <a:r>
-              <a:rPr lang="en-US" sz="1200" b="1" dirty="0">
+              <a:rPr lang="en-US" sz="1108" b="1" dirty="0">
                 <a:latin typeface="Arial" panose="020B0604020202020204" pitchFamily="34" charset="0"/>
                 <a:cs typeface="Arial" panose="020B0604020202020204" pitchFamily="34" charset="0"/>
               </a:rPr>
@@ -3561,8 +4298,8 @@
         </p:nvSpPr>
         <p:spPr>
           <a:xfrm>
-            <a:off x="1902823" y="24285"/>
-            <a:ext cx="731520" cy="276999"/>
+            <a:off x="3410078" y="1676752"/>
+            <a:ext cx="674972" cy="262829"/>
           </a:xfrm>
           <a:prstGeom prst="rect">
             <a:avLst/>
@@ -3576,7 +4313,7 @@
           <a:lstStyle/>
           <a:p>
             <a:r>
-              <a:rPr lang="en-US" sz="1200" b="1" dirty="0">
+              <a:rPr lang="en-US" sz="1108" b="1" dirty="0">
                 <a:latin typeface="Arial" panose="020B0604020202020204" pitchFamily="34" charset="0"/>
                 <a:cs typeface="Arial" panose="020B0604020202020204" pitchFamily="34" charset="0"/>
               </a:rPr>
@@ -3599,8 +4336,8 @@
         </p:nvSpPr>
         <p:spPr>
           <a:xfrm>
-            <a:off x="566058" y="1321024"/>
-            <a:ext cx="731520" cy="276999"/>
+            <a:off x="2176650" y="2873250"/>
+            <a:ext cx="674972" cy="262829"/>
           </a:xfrm>
           <a:prstGeom prst="rect">
             <a:avLst/>
@@ -3614,7 +4351,7 @@
           <a:lstStyle/>
           <a:p>
             <a:r>
-              <a:rPr lang="en-US" sz="1200" b="1" dirty="0">
+              <a:rPr lang="en-US" sz="1108" b="1" dirty="0">
                 <a:latin typeface="Arial" panose="020B0604020202020204" pitchFamily="34" charset="0"/>
                 <a:cs typeface="Arial" panose="020B0604020202020204" pitchFamily="34" charset="0"/>
               </a:rPr>
@@ -3637,8 +4374,8 @@
         </p:nvSpPr>
         <p:spPr>
           <a:xfrm>
-            <a:off x="4786630" y="2318497"/>
-            <a:ext cx="731520" cy="276999"/>
+            <a:off x="6070960" y="3793617"/>
+            <a:ext cx="674972" cy="262829"/>
           </a:xfrm>
           <a:prstGeom prst="rect">
             <a:avLst/>
@@ -3652,7 +4389,7 @@
           <a:lstStyle/>
           <a:p>
             <a:r>
-              <a:rPr lang="en-US" sz="1200" b="1" dirty="0">
+              <a:rPr lang="en-US" sz="1108" b="1" dirty="0">
                 <a:latin typeface="Arial" panose="020B0604020202020204" pitchFamily="34" charset="0"/>
                 <a:cs typeface="Arial" panose="020B0604020202020204" pitchFamily="34" charset="0"/>
               </a:rPr>
@@ -3675,8 +4412,8 @@
         </p:nvSpPr>
         <p:spPr>
           <a:xfrm>
-            <a:off x="6121128" y="4840012"/>
-            <a:ext cx="731520" cy="276999"/>
+            <a:off x="7302299" y="6120212"/>
+            <a:ext cx="674972" cy="262829"/>
           </a:xfrm>
           <a:prstGeom prst="rect">
             <a:avLst/>
@@ -3690,7 +4427,7 @@
           <a:lstStyle/>
           <a:p>
             <a:r>
-              <a:rPr lang="en-US" sz="1200" b="1" dirty="0">
+              <a:rPr lang="en-US" sz="1108" b="1" dirty="0">
                 <a:latin typeface="Arial" panose="020B0604020202020204" pitchFamily="34" charset="0"/>
                 <a:cs typeface="Arial" panose="020B0604020202020204" pitchFamily="34" charset="0"/>
               </a:rPr>
@@ -3713,8 +4450,8 @@
         </p:nvSpPr>
         <p:spPr>
           <a:xfrm>
-            <a:off x="5032103" y="6246537"/>
-            <a:ext cx="731520" cy="276999"/>
+            <a:off x="6297457" y="7418009"/>
+            <a:ext cx="674972" cy="262829"/>
           </a:xfrm>
           <a:prstGeom prst="rect">
             <a:avLst/>
@@ -3728,7 +4465,7 @@
           <a:lstStyle/>
           <a:p>
             <a:r>
-              <a:rPr lang="en-US" sz="1200" b="1" dirty="0">
+              <a:rPr lang="en-US" sz="1108" b="1" dirty="0">
                 <a:latin typeface="Arial" panose="020B0604020202020204" pitchFamily="34" charset="0"/>
                 <a:cs typeface="Arial" panose="020B0604020202020204" pitchFamily="34" charset="0"/>
               </a:rPr>
@@ -3751,8 +4488,8 @@
         </p:nvSpPr>
         <p:spPr>
           <a:xfrm>
-            <a:off x="552996" y="6516503"/>
-            <a:ext cx="731520" cy="276999"/>
+            <a:off x="2164597" y="7667105"/>
+            <a:ext cx="674972" cy="262829"/>
           </a:xfrm>
           <a:prstGeom prst="rect">
             <a:avLst/>
@@ -3766,7 +4503,7 @@
           <a:lstStyle/>
           <a:p>
             <a:r>
-              <a:rPr lang="en-US" sz="1200" b="1" dirty="0">
+              <a:rPr lang="en-US" sz="1108" b="1" dirty="0">
                 <a:latin typeface="Arial" panose="020B0604020202020204" pitchFamily="34" charset="0"/>
                 <a:cs typeface="Arial" panose="020B0604020202020204" pitchFamily="34" charset="0"/>
               </a:rPr>
@@ -3789,8 +4526,8 @@
         </p:nvSpPr>
         <p:spPr>
           <a:xfrm>
-            <a:off x="-26125" y="5266823"/>
-            <a:ext cx="731520" cy="276999"/>
+            <a:off x="1630243" y="6514029"/>
+            <a:ext cx="674972" cy="262829"/>
           </a:xfrm>
           <a:prstGeom prst="rect">
             <a:avLst/>
@@ -3804,7 +4541,7 @@
           <a:lstStyle/>
           <a:p>
             <a:r>
-              <a:rPr lang="en-US" sz="1200" b="1" dirty="0">
+              <a:rPr lang="en-US" sz="1108" b="1" dirty="0">
                 <a:latin typeface="Arial" panose="020B0604020202020204" pitchFamily="34" charset="0"/>
                 <a:cs typeface="Arial" panose="020B0604020202020204" pitchFamily="34" charset="0"/>
               </a:rPr>
@@ -3827,8 +4564,8 @@
         </p:nvSpPr>
         <p:spPr>
           <a:xfrm>
-            <a:off x="5397863" y="5602919"/>
-            <a:ext cx="278674" cy="269966"/>
+            <a:off x="6634945" y="6824142"/>
+            <a:ext cx="257132" cy="249098"/>
           </a:xfrm>
           <a:prstGeom prst="ellipse">
             <a:avLst/>
@@ -3865,7 +4602,7 @@
           <a:lstStyle/>
           <a:p>
             <a:pPr algn="ctr"/>
-            <a:endParaRPr lang="en-US"/>
+            <a:endParaRPr lang="en-US" sz="1661"/>
           </a:p>
         </p:txBody>
       </p:sp>
@@ -3883,8 +4620,8 @@
         </p:nvSpPr>
         <p:spPr>
           <a:xfrm>
-            <a:off x="5676537" y="5595886"/>
-            <a:ext cx="731520" cy="276999"/>
+            <a:off x="6892076" y="6817654"/>
+            <a:ext cx="674972" cy="262829"/>
           </a:xfrm>
           <a:prstGeom prst="rect">
             <a:avLst/>
@@ -3898,7 +4635,7 @@
           <a:lstStyle/>
           <a:p>
             <a:r>
-              <a:rPr lang="en-US" sz="1200" b="1" dirty="0">
+              <a:rPr lang="en-US" sz="1108" b="1" dirty="0">
                 <a:latin typeface="Arial" panose="020B0604020202020204" pitchFamily="34" charset="0"/>
                 <a:cs typeface="Arial" panose="020B0604020202020204" pitchFamily="34" charset="0"/>
               </a:rPr>
@@ -3921,8 +4658,8 @@
         </p:nvSpPr>
         <p:spPr>
           <a:xfrm>
-            <a:off x="2355669" y="413658"/>
-            <a:ext cx="278674" cy="269966"/>
+            <a:off x="3827920" y="2036026"/>
+            <a:ext cx="257132" cy="249098"/>
           </a:xfrm>
           <a:prstGeom prst="ellipse">
             <a:avLst/>
@@ -3959,7 +4696,7 @@
           <a:lstStyle/>
           <a:p>
             <a:pPr algn="ctr"/>
-            <a:endParaRPr lang="en-US"/>
+            <a:endParaRPr lang="en-US" sz="1661"/>
           </a:p>
         </p:txBody>
       </p:sp>
@@ -3977,8 +4714,8 @@
         </p:nvSpPr>
         <p:spPr>
           <a:xfrm>
-            <a:off x="2477589" y="234479"/>
-            <a:ext cx="731520" cy="276999"/>
+            <a:off x="3940414" y="1870698"/>
+            <a:ext cx="674972" cy="262829"/>
           </a:xfrm>
           <a:prstGeom prst="rect">
             <a:avLst/>
@@ -3992,7 +4729,7 @@
           <a:lstStyle/>
           <a:p>
             <a:r>
-              <a:rPr lang="en-US" sz="1200" b="1" dirty="0">
+              <a:rPr lang="en-US" sz="1108" b="1" dirty="0">
                 <a:latin typeface="Arial" panose="020B0604020202020204" pitchFamily="34" charset="0"/>
                 <a:cs typeface="Arial" panose="020B0604020202020204" pitchFamily="34" charset="0"/>
               </a:rPr>
@@ -4015,8 +4752,8 @@
         </p:nvSpPr>
         <p:spPr>
           <a:xfrm>
-            <a:off x="1750424" y="376495"/>
-            <a:ext cx="278674" cy="269966"/>
+            <a:off x="3269462" y="2001736"/>
+            <a:ext cx="257132" cy="249098"/>
           </a:xfrm>
           <a:prstGeom prst="ellipse">
             <a:avLst/>
@@ -4056,7 +4793,7 @@
           <a:lstStyle/>
           <a:p>
             <a:pPr algn="ctr"/>
-            <a:endParaRPr lang="en-US"/>
+            <a:endParaRPr lang="en-US" sz="1661"/>
           </a:p>
         </p:txBody>
       </p:sp>
@@ -4074,8 +4811,8 @@
         </p:nvSpPr>
         <p:spPr>
           <a:xfrm>
-            <a:off x="1341121" y="354373"/>
-            <a:ext cx="522514" cy="276999"/>
+            <a:off x="2891801" y="1981325"/>
+            <a:ext cx="482122" cy="262829"/>
           </a:xfrm>
           <a:prstGeom prst="rect">
             <a:avLst/>
@@ -4089,7 +4826,7 @@
           <a:lstStyle/>
           <a:p>
             <a:r>
-              <a:rPr lang="en-US" sz="1200" b="1" dirty="0">
+              <a:rPr lang="en-US" sz="1108" b="1" dirty="0">
                 <a:latin typeface="Arial" panose="020B0604020202020204" pitchFamily="34" charset="0"/>
                 <a:cs typeface="Arial" panose="020B0604020202020204" pitchFamily="34" charset="0"/>
               </a:rPr>
@@ -4112,8 +4849,8 @@
         </p:nvSpPr>
         <p:spPr>
           <a:xfrm>
-            <a:off x="603704" y="5983604"/>
-            <a:ext cx="278674" cy="269966"/>
+            <a:off x="2211386" y="7175401"/>
+            <a:ext cx="257132" cy="249098"/>
           </a:xfrm>
           <a:prstGeom prst="ellipse">
             <a:avLst/>
@@ -4155,7 +4892,7 @@
           <a:lstStyle/>
           <a:p>
             <a:pPr algn="ctr"/>
-            <a:endParaRPr lang="en-US"/>
+            <a:endParaRPr lang="en-US" sz="1661"/>
           </a:p>
         </p:txBody>
       </p:sp>
@@ -4173,8 +4910,8 @@
         </p:nvSpPr>
         <p:spPr>
           <a:xfrm>
-            <a:off x="0" y="5980087"/>
-            <a:ext cx="731520" cy="276999"/>
+            <a:off x="1654349" y="7172155"/>
+            <a:ext cx="674972" cy="262829"/>
           </a:xfrm>
           <a:prstGeom prst="rect">
             <a:avLst/>
@@ -4188,7 +4925,7 @@
           <a:lstStyle/>
           <a:p>
             <a:r>
-              <a:rPr lang="en-US" sz="1200" b="1" dirty="0">
+              <a:rPr lang="en-US" sz="1108" b="1" dirty="0">
                 <a:latin typeface="Arial" panose="020B0604020202020204" pitchFamily="34" charset="0"/>
                 <a:cs typeface="Arial" panose="020B0604020202020204" pitchFamily="34" charset="0"/>
               </a:rPr>
@@ -4201,764 +4938,6 @@
     <p:extLst>
       <p:ext uri="{BB962C8B-B14F-4D97-AF65-F5344CB8AC3E}">
         <p14:creationId xmlns:p14="http://schemas.microsoft.com/office/powerpoint/2010/main" val="495933287"/>
-      </p:ext>
-    </p:extLst>
-  </p:cSld>
-  <p:clrMapOvr>
-    <a:masterClrMapping/>
-  </p:clrMapOvr>
-</p:sld>
-</file>
-
-<file path=ppt/slides/slide2.xml><?xml version="1.0" encoding="utf-8"?>
-<p:sld xmlns:a="http://schemas.openxmlformats.org/drawingml/2006/main" xmlns:r="http://schemas.openxmlformats.org/officeDocument/2006/relationships" xmlns:p="http://schemas.openxmlformats.org/presentationml/2006/main">
-  <p:cSld>
-    <p:spTree>
-      <p:nvGrpSpPr>
-        <p:cNvPr id="1" name=""/>
-        <p:cNvGrpSpPr/>
-        <p:nvPr/>
-      </p:nvGrpSpPr>
-      <p:grpSpPr>
-        <a:xfrm>
-          <a:off x="0" y="0"/>
-          <a:ext cx="0" cy="0"/>
-          <a:chOff x="0" y="0"/>
-          <a:chExt cx="0" cy="0"/>
-        </a:xfrm>
-      </p:grpSpPr>
-      <p:grpSp>
-        <p:nvGrpSpPr>
-          <p:cNvPr id="22" name="Group 21">
-            <a:extLst>
-              <a:ext uri="{FF2B5EF4-FFF2-40B4-BE49-F238E27FC236}">
-                <a16:creationId xmlns:a16="http://schemas.microsoft.com/office/drawing/2014/main" id="{AED197FB-34A4-2A4D-9C93-7A17A0E7FBEF}"/>
-              </a:ext>
-            </a:extLst>
-          </p:cNvPr>
-          <p:cNvGrpSpPr/>
-          <p:nvPr/>
-        </p:nvGrpSpPr>
-        <p:grpSpPr>
-          <a:xfrm>
-            <a:off x="130628" y="0"/>
-            <a:ext cx="7053943" cy="7315200"/>
-            <a:chOff x="130628" y="0"/>
-            <a:chExt cx="7053943" cy="7315200"/>
-          </a:xfrm>
-        </p:grpSpPr>
-        <p:pic>
-          <p:nvPicPr>
-            <p:cNvPr id="11" name="Picture 10">
-              <a:extLst>
-                <a:ext uri="{FF2B5EF4-FFF2-40B4-BE49-F238E27FC236}">
-                  <a16:creationId xmlns:a16="http://schemas.microsoft.com/office/drawing/2014/main" id="{50D9A207-13B0-B041-87D9-BA76E2BFB4E9}"/>
-                </a:ext>
-              </a:extLst>
-            </p:cNvPr>
-            <p:cNvPicPr>
-              <a:picLocks noChangeAspect="1"/>
-            </p:cNvPicPr>
-            <p:nvPr/>
-          </p:nvPicPr>
-          <p:blipFill>
-            <a:blip r:embed="rId2"/>
-            <a:stretch>
-              <a:fillRect/>
-            </a:stretch>
-          </p:blipFill>
-          <p:spPr>
-            <a:xfrm>
-              <a:off x="130628" y="0"/>
-              <a:ext cx="7053943" cy="7315200"/>
-            </a:xfrm>
-            <a:prstGeom prst="rect">
-              <a:avLst/>
-            </a:prstGeom>
-          </p:spPr>
-        </p:pic>
-        <p:sp>
-          <p:nvSpPr>
-            <p:cNvPr id="12" name="Oval 11">
-              <a:extLst>
-                <a:ext uri="{FF2B5EF4-FFF2-40B4-BE49-F238E27FC236}">
-                  <a16:creationId xmlns:a16="http://schemas.microsoft.com/office/drawing/2014/main" id="{3CA1C9FF-A862-B443-8F4F-AC43582AB489}"/>
-                </a:ext>
-              </a:extLst>
-            </p:cNvPr>
-            <p:cNvSpPr/>
-            <p:nvPr/>
-          </p:nvSpPr>
-          <p:spPr>
-            <a:xfrm>
-              <a:off x="2821577" y="496389"/>
-              <a:ext cx="278674" cy="269966"/>
-            </a:xfrm>
-            <a:prstGeom prst="ellipse">
-              <a:avLst/>
-            </a:prstGeom>
-            <a:solidFill>
-              <a:schemeClr val="accent1">
-                <a:lumMod val="60000"/>
-                <a:lumOff val="40000"/>
-                <a:alpha val="39608"/>
-              </a:schemeClr>
-            </a:solidFill>
-            <a:ln>
-              <a:solidFill>
-                <a:schemeClr val="accent1">
-                  <a:lumMod val="60000"/>
-                  <a:lumOff val="40000"/>
-                </a:schemeClr>
-              </a:solidFill>
-            </a:ln>
-          </p:spPr>
-          <p:style>
-            <a:lnRef idx="2">
-              <a:schemeClr val="accent1">
-                <a:shade val="50000"/>
-              </a:schemeClr>
-            </a:lnRef>
-            <a:fillRef idx="1">
-              <a:schemeClr val="accent1"/>
-            </a:fillRef>
-            <a:effectRef idx="0">
-              <a:schemeClr val="accent1"/>
-            </a:effectRef>
-            <a:fontRef idx="minor">
-              <a:schemeClr val="lt1"/>
-            </a:fontRef>
-          </p:style>
-          <p:txBody>
-            <a:bodyPr rtlCol="0" anchor="ctr"/>
-            <a:lstStyle/>
-            <a:p>
-              <a:pPr algn="ctr"/>
-              <a:endParaRPr lang="en-US"/>
-            </a:p>
-          </p:txBody>
-        </p:sp>
-        <p:sp>
-          <p:nvSpPr>
-            <p:cNvPr id="15" name="Oval 14">
-              <a:extLst>
-                <a:ext uri="{FF2B5EF4-FFF2-40B4-BE49-F238E27FC236}">
-                  <a16:creationId xmlns:a16="http://schemas.microsoft.com/office/drawing/2014/main" id="{F4D6F14E-5B8A-AD4D-AE47-20EE8FCC05E7}"/>
-                </a:ext>
-              </a:extLst>
-            </p:cNvPr>
-            <p:cNvSpPr/>
-            <p:nvPr/>
-          </p:nvSpPr>
-          <p:spPr>
-            <a:xfrm>
-              <a:off x="1058092" y="1328057"/>
-              <a:ext cx="278674" cy="269966"/>
-            </a:xfrm>
-            <a:prstGeom prst="ellipse">
-              <a:avLst/>
-            </a:prstGeom>
-            <a:solidFill>
-              <a:schemeClr val="accent4">
-                <a:lumMod val="60000"/>
-                <a:lumOff val="40000"/>
-                <a:alpha val="39608"/>
-              </a:schemeClr>
-            </a:solidFill>
-            <a:ln>
-              <a:solidFill>
-                <a:schemeClr val="accent4">
-                  <a:lumMod val="60000"/>
-                  <a:lumOff val="40000"/>
-                </a:schemeClr>
-              </a:solidFill>
-            </a:ln>
-          </p:spPr>
-          <p:style>
-            <a:lnRef idx="2">
-              <a:schemeClr val="accent1">
-                <a:shade val="50000"/>
-              </a:schemeClr>
-            </a:lnRef>
-            <a:fillRef idx="1">
-              <a:schemeClr val="accent1"/>
-            </a:fillRef>
-            <a:effectRef idx="0">
-              <a:schemeClr val="accent1"/>
-            </a:effectRef>
-            <a:fontRef idx="minor">
-              <a:schemeClr val="lt1"/>
-            </a:fontRef>
-          </p:style>
-          <p:txBody>
-            <a:bodyPr rtlCol="0" anchor="ctr"/>
-            <a:lstStyle/>
-            <a:p>
-              <a:pPr algn="ctr"/>
-              <a:endParaRPr lang="en-US"/>
-            </a:p>
-          </p:txBody>
-        </p:sp>
-        <p:sp>
-          <p:nvSpPr>
-            <p:cNvPr id="18" name="Oval 17">
-              <a:extLst>
-                <a:ext uri="{FF2B5EF4-FFF2-40B4-BE49-F238E27FC236}">
-                  <a16:creationId xmlns:a16="http://schemas.microsoft.com/office/drawing/2014/main" id="{43C9429A-E35E-1046-A4FB-02BB252F3F8F}"/>
-                </a:ext>
-              </a:extLst>
-            </p:cNvPr>
-            <p:cNvSpPr/>
-            <p:nvPr/>
-          </p:nvSpPr>
-          <p:spPr>
-            <a:xfrm>
-              <a:off x="4753429" y="6253570"/>
-              <a:ext cx="278674" cy="269966"/>
-            </a:xfrm>
-            <a:prstGeom prst="ellipse">
-              <a:avLst/>
-            </a:prstGeom>
-            <a:solidFill>
-              <a:schemeClr val="accent6">
-                <a:lumMod val="50000"/>
-                <a:alpha val="39608"/>
-              </a:schemeClr>
-            </a:solidFill>
-            <a:ln>
-              <a:solidFill>
-                <a:schemeClr val="accent6">
-                  <a:lumMod val="50000"/>
-                </a:schemeClr>
-              </a:solidFill>
-            </a:ln>
-          </p:spPr>
-          <p:style>
-            <a:lnRef idx="2">
-              <a:schemeClr val="accent1">
-                <a:shade val="50000"/>
-              </a:schemeClr>
-            </a:lnRef>
-            <a:fillRef idx="1">
-              <a:schemeClr val="accent1"/>
-            </a:fillRef>
-            <a:effectRef idx="0">
-              <a:schemeClr val="accent1"/>
-            </a:effectRef>
-            <a:fontRef idx="minor">
-              <a:schemeClr val="lt1"/>
-            </a:fontRef>
-          </p:style>
-          <p:txBody>
-            <a:bodyPr rtlCol="0" anchor="ctr"/>
-            <a:lstStyle/>
-            <a:p>
-              <a:pPr algn="ctr"/>
-              <a:endParaRPr lang="en-US"/>
-            </a:p>
-          </p:txBody>
-        </p:sp>
-        <p:sp>
-          <p:nvSpPr>
-            <p:cNvPr id="19" name="Oval 18">
-              <a:extLst>
-                <a:ext uri="{FF2B5EF4-FFF2-40B4-BE49-F238E27FC236}">
-                  <a16:creationId xmlns:a16="http://schemas.microsoft.com/office/drawing/2014/main" id="{278BFD91-952E-1C4C-A54B-D640A4D25C2C}"/>
-                </a:ext>
-              </a:extLst>
-            </p:cNvPr>
-            <p:cNvSpPr/>
-            <p:nvPr/>
-          </p:nvSpPr>
-          <p:spPr>
-            <a:xfrm>
-              <a:off x="5842454" y="4847045"/>
-              <a:ext cx="278674" cy="269966"/>
-            </a:xfrm>
-            <a:prstGeom prst="ellipse">
-              <a:avLst/>
-            </a:prstGeom>
-            <a:solidFill>
-              <a:schemeClr val="accent1">
-                <a:lumMod val="75000"/>
-                <a:alpha val="39608"/>
-              </a:schemeClr>
-            </a:solidFill>
-            <a:ln>
-              <a:solidFill>
-                <a:schemeClr val="accent1">
-                  <a:lumMod val="75000"/>
-                </a:schemeClr>
-              </a:solidFill>
-            </a:ln>
-          </p:spPr>
-          <p:style>
-            <a:lnRef idx="2">
-              <a:schemeClr val="accent1">
-                <a:shade val="50000"/>
-              </a:schemeClr>
-            </a:lnRef>
-            <a:fillRef idx="1">
-              <a:schemeClr val="accent1"/>
-            </a:fillRef>
-            <a:effectRef idx="0">
-              <a:schemeClr val="accent1"/>
-            </a:effectRef>
-            <a:fontRef idx="minor">
-              <a:schemeClr val="lt1"/>
-            </a:fontRef>
-          </p:style>
-          <p:txBody>
-            <a:bodyPr rtlCol="0" anchor="ctr"/>
-            <a:lstStyle/>
-            <a:p>
-              <a:pPr algn="ctr"/>
-              <a:endParaRPr lang="en-US"/>
-            </a:p>
-          </p:txBody>
-        </p:sp>
-        <p:sp>
-          <p:nvSpPr>
-            <p:cNvPr id="20" name="Oval 19">
-              <a:extLst>
-                <a:ext uri="{FF2B5EF4-FFF2-40B4-BE49-F238E27FC236}">
-                  <a16:creationId xmlns:a16="http://schemas.microsoft.com/office/drawing/2014/main" id="{C0D3AAEA-D9D7-7E4F-B605-A917B1A0FCCC}"/>
-                </a:ext>
-              </a:extLst>
-            </p:cNvPr>
-            <p:cNvSpPr/>
-            <p:nvPr/>
-          </p:nvSpPr>
-          <p:spPr>
-            <a:xfrm>
-              <a:off x="4529727" y="2322014"/>
-              <a:ext cx="278674" cy="269966"/>
-            </a:xfrm>
-            <a:prstGeom prst="ellipse">
-              <a:avLst/>
-            </a:prstGeom>
-            <a:solidFill>
-              <a:schemeClr val="accent2">
-                <a:lumMod val="75000"/>
-                <a:alpha val="39608"/>
-              </a:schemeClr>
-            </a:solidFill>
-            <a:ln>
-              <a:solidFill>
-                <a:schemeClr val="accent2">
-                  <a:lumMod val="75000"/>
-                </a:schemeClr>
-              </a:solidFill>
-            </a:ln>
-          </p:spPr>
-          <p:style>
-            <a:lnRef idx="2">
-              <a:schemeClr val="accent1">
-                <a:shade val="50000"/>
-              </a:schemeClr>
-            </a:lnRef>
-            <a:fillRef idx="1">
-              <a:schemeClr val="accent1"/>
-            </a:fillRef>
-            <a:effectRef idx="0">
-              <a:schemeClr val="accent1"/>
-            </a:effectRef>
-            <a:fontRef idx="minor">
-              <a:schemeClr val="lt1"/>
-            </a:fontRef>
-          </p:style>
-          <p:txBody>
-            <a:bodyPr rtlCol="0" anchor="ctr"/>
-            <a:lstStyle/>
-            <a:p>
-              <a:pPr algn="ctr"/>
-              <a:endParaRPr lang="en-US"/>
-            </a:p>
-          </p:txBody>
-        </p:sp>
-      </p:grpSp>
-      <p:sp>
-        <p:nvSpPr>
-          <p:cNvPr id="23" name="TextBox 22">
-            <a:extLst>
-              <a:ext uri="{FF2B5EF4-FFF2-40B4-BE49-F238E27FC236}">
-                <a16:creationId xmlns:a16="http://schemas.microsoft.com/office/drawing/2014/main" id="{FA82E9AD-0167-CF4D-BC21-ABF1A6263315}"/>
-              </a:ext>
-            </a:extLst>
-          </p:cNvPr>
-          <p:cNvSpPr txBox="1"/>
-          <p:nvPr/>
-        </p:nvSpPr>
-        <p:spPr>
-          <a:xfrm>
-            <a:off x="3100251" y="496389"/>
-            <a:ext cx="1030424" cy="276999"/>
-          </a:xfrm>
-          <a:prstGeom prst="rect">
-            <a:avLst/>
-          </a:prstGeom>
-          <a:noFill/>
-        </p:spPr>
-        <p:txBody>
-          <a:bodyPr wrap="square" rtlCol="0">
-            <a:spAutoFit/>
-          </a:bodyPr>
-          <a:lstStyle/>
-          <a:p>
-            <a:r>
-              <a:rPr lang="en-US" sz="1200" b="1" dirty="0">
-                <a:latin typeface="Arial" panose="020B0604020202020204" pitchFamily="34" charset="0"/>
-                <a:cs typeface="Arial" panose="020B0604020202020204" pitchFamily="34" charset="0"/>
-              </a:rPr>
-              <a:t>ST8, ST239</a:t>
-            </a:r>
-          </a:p>
-        </p:txBody>
-      </p:sp>
-      <p:sp>
-        <p:nvSpPr>
-          <p:cNvPr id="25" name="TextBox 24">
-            <a:extLst>
-              <a:ext uri="{FF2B5EF4-FFF2-40B4-BE49-F238E27FC236}">
-                <a16:creationId xmlns:a16="http://schemas.microsoft.com/office/drawing/2014/main" id="{23D9265C-156F-5249-A311-30E43A562ACF}"/>
-              </a:ext>
-            </a:extLst>
-          </p:cNvPr>
-          <p:cNvSpPr txBox="1"/>
-          <p:nvPr/>
-        </p:nvSpPr>
-        <p:spPr>
-          <a:xfrm>
-            <a:off x="130628" y="1321024"/>
-            <a:ext cx="1166950" cy="276999"/>
-          </a:xfrm>
-          <a:prstGeom prst="rect">
-            <a:avLst/>
-          </a:prstGeom>
-          <a:noFill/>
-        </p:spPr>
-        <p:txBody>
-          <a:bodyPr wrap="square" rtlCol="0">
-            <a:spAutoFit/>
-          </a:bodyPr>
-          <a:lstStyle/>
-          <a:p>
-            <a:r>
-              <a:rPr lang="en-US" sz="1200" b="1" dirty="0">
-                <a:latin typeface="Arial" panose="020B0604020202020204" pitchFamily="34" charset="0"/>
-                <a:cs typeface="Arial" panose="020B0604020202020204" pitchFamily="34" charset="0"/>
-              </a:rPr>
-              <a:t>ST5, ST105</a:t>
-            </a:r>
-          </a:p>
-        </p:txBody>
-      </p:sp>
-      <p:sp>
-        <p:nvSpPr>
-          <p:cNvPr id="26" name="TextBox 25">
-            <a:extLst>
-              <a:ext uri="{FF2B5EF4-FFF2-40B4-BE49-F238E27FC236}">
-                <a16:creationId xmlns:a16="http://schemas.microsoft.com/office/drawing/2014/main" id="{2B0003EF-FFB9-5047-8AF7-BCBCDD34CC7B}"/>
-              </a:ext>
-            </a:extLst>
-          </p:cNvPr>
-          <p:cNvSpPr txBox="1"/>
-          <p:nvPr/>
-        </p:nvSpPr>
-        <p:spPr>
-          <a:xfrm>
-            <a:off x="4786630" y="2318497"/>
-            <a:ext cx="731520" cy="276999"/>
-          </a:xfrm>
-          <a:prstGeom prst="rect">
-            <a:avLst/>
-          </a:prstGeom>
-          <a:noFill/>
-        </p:spPr>
-        <p:txBody>
-          <a:bodyPr wrap="square" rtlCol="0">
-            <a:spAutoFit/>
-          </a:bodyPr>
-          <a:lstStyle/>
-          <a:p>
-            <a:r>
-              <a:rPr lang="en-US" sz="1200" b="1" dirty="0">
-                <a:latin typeface="Arial" panose="020B0604020202020204" pitchFamily="34" charset="0"/>
-                <a:cs typeface="Arial" panose="020B0604020202020204" pitchFamily="34" charset="0"/>
-              </a:rPr>
-              <a:t>ST22</a:t>
-            </a:r>
-          </a:p>
-        </p:txBody>
-      </p:sp>
-      <p:sp>
-        <p:nvSpPr>
-          <p:cNvPr id="27" name="TextBox 26">
-            <a:extLst>
-              <a:ext uri="{FF2B5EF4-FFF2-40B4-BE49-F238E27FC236}">
-                <a16:creationId xmlns:a16="http://schemas.microsoft.com/office/drawing/2014/main" id="{57261D83-7E2A-FC46-A297-2F964A02E596}"/>
-              </a:ext>
-            </a:extLst>
-          </p:cNvPr>
-          <p:cNvSpPr txBox="1"/>
-          <p:nvPr/>
-        </p:nvSpPr>
-        <p:spPr>
-          <a:xfrm>
-            <a:off x="6121128" y="4840012"/>
-            <a:ext cx="731520" cy="276999"/>
-          </a:xfrm>
-          <a:prstGeom prst="rect">
-            <a:avLst/>
-          </a:prstGeom>
-          <a:noFill/>
-        </p:spPr>
-        <p:txBody>
-          <a:bodyPr wrap="square" rtlCol="0">
-            <a:spAutoFit/>
-          </a:bodyPr>
-          <a:lstStyle/>
-          <a:p>
-            <a:r>
-              <a:rPr lang="en-US" sz="1200" b="1" dirty="0">
-                <a:latin typeface="Arial" panose="020B0604020202020204" pitchFamily="34" charset="0"/>
-                <a:cs typeface="Arial" panose="020B0604020202020204" pitchFamily="34" charset="0"/>
-              </a:rPr>
-              <a:t>ST45</a:t>
-            </a:r>
-          </a:p>
-        </p:txBody>
-      </p:sp>
-      <p:sp>
-        <p:nvSpPr>
-          <p:cNvPr id="28" name="TextBox 27">
-            <a:extLst>
-              <a:ext uri="{FF2B5EF4-FFF2-40B4-BE49-F238E27FC236}">
-                <a16:creationId xmlns:a16="http://schemas.microsoft.com/office/drawing/2014/main" id="{F410C2B2-FDC3-EB4B-848C-A46855FBA176}"/>
-              </a:ext>
-            </a:extLst>
-          </p:cNvPr>
-          <p:cNvSpPr txBox="1"/>
-          <p:nvPr/>
-        </p:nvSpPr>
-        <p:spPr>
-          <a:xfrm>
-            <a:off x="5032103" y="6246537"/>
-            <a:ext cx="1009922" cy="276999"/>
-          </a:xfrm>
-          <a:prstGeom prst="rect">
-            <a:avLst/>
-          </a:prstGeom>
-          <a:noFill/>
-        </p:spPr>
-        <p:txBody>
-          <a:bodyPr wrap="square" rtlCol="0">
-            <a:spAutoFit/>
-          </a:bodyPr>
-          <a:lstStyle/>
-          <a:p>
-            <a:r>
-              <a:rPr lang="en-US" sz="1200" b="1" dirty="0">
-                <a:latin typeface="Arial" panose="020B0604020202020204" pitchFamily="34" charset="0"/>
-                <a:cs typeface="Arial" panose="020B0604020202020204" pitchFamily="34" charset="0"/>
-              </a:rPr>
-              <a:t>ST30, ST36</a:t>
-            </a:r>
-          </a:p>
-        </p:txBody>
-      </p:sp>
-      <p:sp>
-        <p:nvSpPr>
-          <p:cNvPr id="31" name="Oval 30">
-            <a:extLst>
-              <a:ext uri="{FF2B5EF4-FFF2-40B4-BE49-F238E27FC236}">
-                <a16:creationId xmlns:a16="http://schemas.microsoft.com/office/drawing/2014/main" id="{88E750EB-1EBE-3245-8A8A-61254760C603}"/>
-              </a:ext>
-            </a:extLst>
-          </p:cNvPr>
-          <p:cNvSpPr/>
-          <p:nvPr/>
-        </p:nvSpPr>
-        <p:spPr>
-          <a:xfrm>
-            <a:off x="5397863" y="5602919"/>
-            <a:ext cx="278674" cy="269966"/>
-          </a:xfrm>
-          <a:prstGeom prst="ellipse">
-            <a:avLst/>
-          </a:prstGeom>
-          <a:solidFill>
-            <a:srgbClr val="FF0000">
-              <a:alpha val="39608"/>
-            </a:srgbClr>
-          </a:solidFill>
-          <a:ln>
-            <a:solidFill>
-              <a:srgbClr val="FF0000"/>
-            </a:solidFill>
-          </a:ln>
-        </p:spPr>
-        <p:style>
-          <a:lnRef idx="2">
-            <a:schemeClr val="accent1">
-              <a:shade val="50000"/>
-            </a:schemeClr>
-          </a:lnRef>
-          <a:fillRef idx="1">
-            <a:schemeClr val="accent1"/>
-          </a:fillRef>
-          <a:effectRef idx="0">
-            <a:schemeClr val="accent1"/>
-          </a:effectRef>
-          <a:fontRef idx="minor">
-            <a:schemeClr val="lt1"/>
-          </a:fontRef>
-        </p:style>
-        <p:txBody>
-          <a:bodyPr rtlCol="0" anchor="ctr"/>
-          <a:lstStyle/>
-          <a:p>
-            <a:pPr algn="ctr"/>
-            <a:endParaRPr lang="en-US"/>
-          </a:p>
-        </p:txBody>
-      </p:sp>
-      <p:sp>
-        <p:nvSpPr>
-          <p:cNvPr id="32" name="TextBox 31">
-            <a:extLst>
-              <a:ext uri="{FF2B5EF4-FFF2-40B4-BE49-F238E27FC236}">
-                <a16:creationId xmlns:a16="http://schemas.microsoft.com/office/drawing/2014/main" id="{D22D76FA-FB07-DD4F-9573-F231B2732E97}"/>
-              </a:ext>
-            </a:extLst>
-          </p:cNvPr>
-          <p:cNvSpPr txBox="1"/>
-          <p:nvPr/>
-        </p:nvSpPr>
-        <p:spPr>
-          <a:xfrm>
-            <a:off x="5676537" y="5595886"/>
-            <a:ext cx="731520" cy="276999"/>
-          </a:xfrm>
-          <a:prstGeom prst="rect">
-            <a:avLst/>
-          </a:prstGeom>
-          <a:noFill/>
-        </p:spPr>
-        <p:txBody>
-          <a:bodyPr wrap="square" rtlCol="0">
-            <a:spAutoFit/>
-          </a:bodyPr>
-          <a:lstStyle/>
-          <a:p>
-            <a:r>
-              <a:rPr lang="en-US" sz="1200" b="1" dirty="0">
-                <a:latin typeface="Arial" panose="020B0604020202020204" pitchFamily="34" charset="0"/>
-                <a:cs typeface="Arial" panose="020B0604020202020204" pitchFamily="34" charset="0"/>
-              </a:rPr>
-              <a:t>ST398</a:t>
-            </a:r>
-          </a:p>
-        </p:txBody>
-      </p:sp>
-      <p:sp>
-        <p:nvSpPr>
-          <p:cNvPr id="33" name="Oval 32">
-            <a:extLst>
-              <a:ext uri="{FF2B5EF4-FFF2-40B4-BE49-F238E27FC236}">
-                <a16:creationId xmlns:a16="http://schemas.microsoft.com/office/drawing/2014/main" id="{46DAEB19-745E-9F41-B3C3-F3CF7FD577F8}"/>
-              </a:ext>
-            </a:extLst>
-          </p:cNvPr>
-          <p:cNvSpPr/>
-          <p:nvPr/>
-        </p:nvSpPr>
-        <p:spPr>
-          <a:xfrm>
-            <a:off x="2355669" y="413658"/>
-            <a:ext cx="278674" cy="269966"/>
-          </a:xfrm>
-          <a:prstGeom prst="ellipse">
-            <a:avLst/>
-          </a:prstGeom>
-          <a:solidFill>
-            <a:srgbClr val="A74E5D">
-              <a:alpha val="39608"/>
-            </a:srgbClr>
-          </a:solidFill>
-          <a:ln>
-            <a:solidFill>
-              <a:srgbClr val="A74E5D"/>
-            </a:solidFill>
-          </a:ln>
-        </p:spPr>
-        <p:style>
-          <a:lnRef idx="2">
-            <a:schemeClr val="accent1">
-              <a:shade val="50000"/>
-            </a:schemeClr>
-          </a:lnRef>
-          <a:fillRef idx="1">
-            <a:schemeClr val="accent1"/>
-          </a:fillRef>
-          <a:effectRef idx="0">
-            <a:schemeClr val="accent1"/>
-          </a:effectRef>
-          <a:fontRef idx="minor">
-            <a:schemeClr val="lt1"/>
-          </a:fontRef>
-        </p:style>
-        <p:txBody>
-          <a:bodyPr rtlCol="0" anchor="ctr"/>
-          <a:lstStyle/>
-          <a:p>
-            <a:pPr algn="ctr"/>
-            <a:endParaRPr lang="en-US"/>
-          </a:p>
-        </p:txBody>
-      </p:sp>
-      <p:sp>
-        <p:nvSpPr>
-          <p:cNvPr id="34" name="TextBox 33">
-            <a:extLst>
-              <a:ext uri="{FF2B5EF4-FFF2-40B4-BE49-F238E27FC236}">
-                <a16:creationId xmlns:a16="http://schemas.microsoft.com/office/drawing/2014/main" id="{D856C469-33D0-4D4E-8D81-3FFF17DE8804}"/>
-              </a:ext>
-            </a:extLst>
-          </p:cNvPr>
-          <p:cNvSpPr txBox="1"/>
-          <p:nvPr/>
-        </p:nvSpPr>
-        <p:spPr>
-          <a:xfrm>
-            <a:off x="2477589" y="234479"/>
-            <a:ext cx="731520" cy="276999"/>
-          </a:xfrm>
-          <a:prstGeom prst="rect">
-            <a:avLst/>
-          </a:prstGeom>
-          <a:noFill/>
-        </p:spPr>
-        <p:txBody>
-          <a:bodyPr wrap="square" rtlCol="0">
-            <a:spAutoFit/>
-          </a:bodyPr>
-          <a:lstStyle/>
-          <a:p>
-            <a:r>
-              <a:rPr lang="en-US" sz="1200" b="1" dirty="0">
-                <a:latin typeface="Arial" panose="020B0604020202020204" pitchFamily="34" charset="0"/>
-                <a:cs typeface="Arial" panose="020B0604020202020204" pitchFamily="34" charset="0"/>
-              </a:rPr>
-              <a:t>ST15</a:t>
-            </a:r>
-          </a:p>
-        </p:txBody>
-      </p:sp>
-    </p:spTree>
-    <p:extLst>
-      <p:ext uri="{BB962C8B-B14F-4D97-AF65-F5344CB8AC3E}">
-        <p14:creationId xmlns:p14="http://schemas.microsoft.com/office/powerpoint/2010/main" val="3625486768"/>
       </p:ext>
     </p:extLst>
   </p:cSld>

</xml_diff>